<commit_message>
Last review before presentation
</commit_message>
<xml_diff>
--- a/CTM.pptx
+++ b/CTM.pptx
@@ -5,11 +5,16 @@
     <p:sldMasterId id="2147483648" r:id="rId1"/>
   </p:sldMasterIdLst>
   <p:notesMasterIdLst>
-    <p:notesMasterId r:id="rId4"/>
+    <p:notesMasterId r:id="rId9"/>
   </p:notesMasterIdLst>
   <p:sldIdLst>
     <p:sldId id="256" r:id="rId2"/>
-    <p:sldId id="257" r:id="rId3"/>
+    <p:sldId id="258" r:id="rId3"/>
+    <p:sldId id="260" r:id="rId4"/>
+    <p:sldId id="259" r:id="rId5"/>
+    <p:sldId id="261" r:id="rId6"/>
+    <p:sldId id="262" r:id="rId7"/>
+    <p:sldId id="264" r:id="rId8"/>
   </p:sldIdLst>
   <p:sldSz cx="12192000" cy="6858000"/>
   <p:notesSz cx="6858000" cy="9144000"/>
@@ -108,6 +113,14 @@
       </a:defRPr>
     </a:lvl9pPr>
   </p:defaultTextStyle>
+  <p:extLst>
+    <p:ext uri="{EFAFB233-063F-42B5-8137-9DF3F51BA10A}">
+      <p15:sldGuideLst xmlns:p15="http://schemas.microsoft.com/office/powerpoint/2012/main"/>
+    </p:ext>
+    <p:ext uri="{2D200454-40CA-4A62-9FC3-DE9A4176ACB9}">
+      <p15:notesGuideLst xmlns:p15="http://schemas.microsoft.com/office/powerpoint/2012/main"/>
+    </p:ext>
+  </p:extLst>
 </p:presentation>
 </file>
 
@@ -193,7 +206,7 @@
           <a:p>
             <a:fld id="{E6A996B3-6150-4A5F-A2E3-C50B509637F8}" type="datetimeFigureOut">
               <a:rPr lang="fr-FR" smtClean="0"/>
-              <a:t>13/12/2022</a:t>
+              <a:t>16/12/2022</a:t>
             </a:fld>
             <a:endParaRPr lang="fr-FR"/>
           </a:p>
@@ -691,7 +704,7 @@
           <a:p>
             <a:fld id="{67E76C0C-61DA-4E0B-BBC3-26D404278010}" type="datetimeFigureOut">
               <a:rPr lang="fr-FR" smtClean="0"/>
-              <a:t>13/12/2022</a:t>
+              <a:t>16/12/2022</a:t>
             </a:fld>
             <a:endParaRPr lang="fr-FR"/>
           </a:p>
@@ -889,7 +902,7 @@
           <a:p>
             <a:fld id="{67E76C0C-61DA-4E0B-BBC3-26D404278010}" type="datetimeFigureOut">
               <a:rPr lang="fr-FR" smtClean="0"/>
-              <a:t>13/12/2022</a:t>
+              <a:t>16/12/2022</a:t>
             </a:fld>
             <a:endParaRPr lang="fr-FR"/>
           </a:p>
@@ -1097,7 +1110,7 @@
           <a:p>
             <a:fld id="{67E76C0C-61DA-4E0B-BBC3-26D404278010}" type="datetimeFigureOut">
               <a:rPr lang="fr-FR" smtClean="0"/>
-              <a:t>13/12/2022</a:t>
+              <a:t>16/12/2022</a:t>
             </a:fld>
             <a:endParaRPr lang="fr-FR"/>
           </a:p>
@@ -1295,7 +1308,7 @@
           <a:p>
             <a:fld id="{67E76C0C-61DA-4E0B-BBC3-26D404278010}" type="datetimeFigureOut">
               <a:rPr lang="fr-FR" smtClean="0"/>
-              <a:t>13/12/2022</a:t>
+              <a:t>16/12/2022</a:t>
             </a:fld>
             <a:endParaRPr lang="fr-FR"/>
           </a:p>
@@ -1570,7 +1583,7 @@
           <a:p>
             <a:fld id="{67E76C0C-61DA-4E0B-BBC3-26D404278010}" type="datetimeFigureOut">
               <a:rPr lang="fr-FR" smtClean="0"/>
-              <a:t>13/12/2022</a:t>
+              <a:t>16/12/2022</a:t>
             </a:fld>
             <a:endParaRPr lang="fr-FR"/>
           </a:p>
@@ -1835,7 +1848,7 @@
           <a:p>
             <a:fld id="{67E76C0C-61DA-4E0B-BBC3-26D404278010}" type="datetimeFigureOut">
               <a:rPr lang="fr-FR" smtClean="0"/>
-              <a:t>13/12/2022</a:t>
+              <a:t>16/12/2022</a:t>
             </a:fld>
             <a:endParaRPr lang="fr-FR"/>
           </a:p>
@@ -2247,7 +2260,7 @@
           <a:p>
             <a:fld id="{67E76C0C-61DA-4E0B-BBC3-26D404278010}" type="datetimeFigureOut">
               <a:rPr lang="fr-FR" smtClean="0"/>
-              <a:t>13/12/2022</a:t>
+              <a:t>16/12/2022</a:t>
             </a:fld>
             <a:endParaRPr lang="fr-FR"/>
           </a:p>
@@ -2388,7 +2401,7 @@
           <a:p>
             <a:fld id="{67E76C0C-61DA-4E0B-BBC3-26D404278010}" type="datetimeFigureOut">
               <a:rPr lang="fr-FR" smtClean="0"/>
-              <a:t>13/12/2022</a:t>
+              <a:t>16/12/2022</a:t>
             </a:fld>
             <a:endParaRPr lang="fr-FR"/>
           </a:p>
@@ -2501,7 +2514,7 @@
           <a:p>
             <a:fld id="{67E76C0C-61DA-4E0B-BBC3-26D404278010}" type="datetimeFigureOut">
               <a:rPr lang="fr-FR" smtClean="0"/>
-              <a:t>13/12/2022</a:t>
+              <a:t>16/12/2022</a:t>
             </a:fld>
             <a:endParaRPr lang="fr-FR"/>
           </a:p>
@@ -2812,7 +2825,7 @@
           <a:p>
             <a:fld id="{67E76C0C-61DA-4E0B-BBC3-26D404278010}" type="datetimeFigureOut">
               <a:rPr lang="fr-FR" smtClean="0"/>
-              <a:t>13/12/2022</a:t>
+              <a:t>16/12/2022</a:t>
             </a:fld>
             <a:endParaRPr lang="fr-FR"/>
           </a:p>
@@ -3100,7 +3113,7 @@
           <a:p>
             <a:fld id="{67E76C0C-61DA-4E0B-BBC3-26D404278010}" type="datetimeFigureOut">
               <a:rPr lang="fr-FR" smtClean="0"/>
-              <a:t>13/12/2022</a:t>
+              <a:t>16/12/2022</a:t>
             </a:fld>
             <a:endParaRPr lang="fr-FR"/>
           </a:p>
@@ -3341,7 +3354,7 @@
           <a:p>
             <a:fld id="{67E76C0C-61DA-4E0B-BBC3-26D404278010}" type="datetimeFigureOut">
               <a:rPr lang="fr-FR" smtClean="0"/>
-              <a:t>13/12/2022</a:t>
+              <a:t>16/12/2022</a:t>
             </a:fld>
             <a:endParaRPr lang="fr-FR"/>
           </a:p>
@@ -3774,7 +3787,12 @@
             <p:ph type="ctrTitle"/>
           </p:nvPr>
         </p:nvSpPr>
-        <p:spPr/>
+        <p:spPr>
+          <a:xfrm>
+            <a:off x="1524000" y="3882959"/>
+            <a:ext cx="9144000" cy="2387600"/>
+          </a:xfrm>
+        </p:spPr>
         <p:txBody>
           <a:bodyPr/>
           <a:lstStyle/>
@@ -3790,6 +3808,42 @@
           </a:p>
         </p:txBody>
       </p:sp>
+      <p:pic>
+        <p:nvPicPr>
+          <p:cNvPr id="4" name="Image 3">
+            <a:extLst>
+              <a:ext uri="{FF2B5EF4-FFF2-40B4-BE49-F238E27FC236}">
+                <a16:creationId xmlns:a16="http://schemas.microsoft.com/office/drawing/2014/main" id="{0C1E7971-423B-7AD1-B7F4-53CDBF95BDAB}"/>
+              </a:ext>
+            </a:extLst>
+          </p:cNvPr>
+          <p:cNvPicPr>
+            <a:picLocks noChangeAspect="1"/>
+          </p:cNvPicPr>
+          <p:nvPr/>
+        </p:nvPicPr>
+        <p:blipFill>
+          <a:blip r:embed="rId3">
+            <a:extLst>
+              <a:ext uri="{28A0092B-C50C-407E-A947-70E740481C1C}">
+                <a14:useLocalDpi xmlns:a14="http://schemas.microsoft.com/office/drawing/2010/main" val="0"/>
+              </a:ext>
+            </a:extLst>
+          </a:blip>
+          <a:stretch>
+            <a:fillRect/>
+          </a:stretch>
+        </p:blipFill>
+        <p:spPr>
+          <a:xfrm>
+            <a:off x="4249200" y="735190"/>
+            <a:ext cx="3944400" cy="3944400"/>
+          </a:xfrm>
+          <a:prstGeom prst="rect">
+            <a:avLst/>
+          </a:prstGeom>
+        </p:spPr>
+      </p:pic>
     </p:spTree>
     <p:extLst>
       <p:ext uri="{BB962C8B-B14F-4D97-AF65-F5344CB8AC3E}">
@@ -3825,7 +3879,7 @@
           <p:cNvPr id="2" name="Titre 1">
             <a:extLst>
               <a:ext uri="{FF2B5EF4-FFF2-40B4-BE49-F238E27FC236}">
-                <a16:creationId xmlns:a16="http://schemas.microsoft.com/office/drawing/2014/main" id="{6EACCD2A-021D-A3A8-4274-85A6B5358846}"/>
+                <a16:creationId xmlns:a16="http://schemas.microsoft.com/office/drawing/2014/main" id="{8D0BE7B8-BD59-A209-C860-906E75523200}"/>
               </a:ext>
             </a:extLst>
           </p:cNvPr>
@@ -3836,12 +3890,37 @@
             <p:ph type="title"/>
           </p:nvPr>
         </p:nvSpPr>
-        <p:spPr/>
+        <p:spPr>
+          <a:xfrm>
+            <a:off x="838200" y="294789"/>
+            <a:ext cx="10515600" cy="1325563"/>
+          </a:xfrm>
+          <a:ln w="22225">
+            <a:solidFill>
+              <a:srgbClr val="00B0F0"/>
+            </a:solidFill>
+          </a:ln>
+        </p:spPr>
         <p:txBody>
           <a:bodyPr/>
           <a:lstStyle/>
           <a:p>
-            <a:endParaRPr lang="fr-FR"/>
+            <a:r>
+              <a:rPr lang="fr-FR" sz="3200" b="1" dirty="0" err="1"/>
+              <a:t>Clinical</a:t>
+            </a:r>
+            <a:r>
+              <a:rPr lang="fr-FR" sz="3200" b="1" dirty="0"/>
+              <a:t> Trial Management</a:t>
+            </a:r>
+            <a:br>
+              <a:rPr lang="fr-FR" dirty="0"/>
+            </a:br>
+            <a:r>
+              <a:rPr lang="fr-FR" sz="2800" dirty="0" err="1"/>
+              <a:t>Overview</a:t>
+            </a:r>
+            <a:endParaRPr lang="fr-FR" sz="2800" dirty="0"/>
           </a:p>
         </p:txBody>
       </p:sp>
@@ -3850,7 +3929,7 @@
           <p:cNvPr id="3" name="Espace réservé du contenu 2">
             <a:extLst>
               <a:ext uri="{FF2B5EF4-FFF2-40B4-BE49-F238E27FC236}">
-                <a16:creationId xmlns:a16="http://schemas.microsoft.com/office/drawing/2014/main" id="{EE173A51-077C-80BD-92C2-0CDD3CDFCB2D}"/>
+                <a16:creationId xmlns:a16="http://schemas.microsoft.com/office/drawing/2014/main" id="{E6D735B3-B6A4-8943-CA7C-3CE472230AB1}"/>
               </a:ext>
             </a:extLst>
           </p:cNvPr>
@@ -3863,34 +3942,4363 @@
         </p:nvSpPr>
         <p:spPr/>
         <p:txBody>
-          <a:bodyPr/>
+          <a:bodyPr>
+            <a:normAutofit fontScale="92500"/>
+          </a:bodyPr>
           <a:lstStyle/>
           <a:p>
-            <a:r>
-              <a:rPr lang="fr-FR" dirty="0"/>
-              <a:t>Business </a:t>
-            </a:r>
-            <a:r>
-              <a:rPr lang="fr-FR" dirty="0" err="1"/>
-              <a:t>rules</a:t>
-            </a:r>
+            <a:pPr marL="0" indent="0">
+              <a:buNone/>
+            </a:pPr>
+            <a:r>
+              <a:rPr lang="fr-FR" sz="2400" dirty="0"/>
+              <a:t>« </a:t>
+            </a:r>
+            <a:r>
+              <a:rPr lang="fr-FR" sz="2400" dirty="0">
+                <a:solidFill>
+                  <a:srgbClr val="00B0F0"/>
+                </a:solidFill>
+              </a:rPr>
+              <a:t>As a </a:t>
+            </a:r>
+            <a:r>
+              <a:rPr lang="fr-FR" sz="2400" dirty="0" err="1">
+                <a:solidFill>
+                  <a:srgbClr val="00B0F0"/>
+                </a:solidFill>
+              </a:rPr>
+              <a:t>Clinical</a:t>
+            </a:r>
+            <a:r>
+              <a:rPr lang="fr-FR" sz="2400" dirty="0">
+                <a:solidFill>
+                  <a:srgbClr val="00B0F0"/>
+                </a:solidFill>
+              </a:rPr>
+              <a:t> Trial Manger,</a:t>
+            </a:r>
+            <a:r>
+              <a:rPr lang="fr-FR" sz="2400" dirty="0"/>
+              <a:t> I </a:t>
+            </a:r>
+            <a:r>
+              <a:rPr lang="fr-FR" sz="2400" dirty="0" err="1"/>
+              <a:t>need</a:t>
+            </a:r>
+            <a:r>
+              <a:rPr lang="fr-FR" sz="2400" dirty="0"/>
+              <a:t> to </a:t>
+            </a:r>
+            <a:r>
+              <a:rPr lang="fr-FR" sz="2400" dirty="0" err="1"/>
+              <a:t>view</a:t>
+            </a:r>
+            <a:r>
+              <a:rPr lang="fr-FR" sz="2400" dirty="0"/>
+              <a:t> all </a:t>
+            </a:r>
+            <a:r>
+              <a:rPr lang="fr-FR" sz="2400" dirty="0" err="1"/>
+              <a:t>studies</a:t>
+            </a:r>
+            <a:r>
+              <a:rPr lang="fr-FR" sz="2400" dirty="0"/>
+              <a:t> in portfolio …</a:t>
+            </a:r>
+          </a:p>
+          <a:p>
+            <a:pPr marL="0" indent="0" algn="r">
+              <a:buNone/>
+            </a:pPr>
+            <a:r>
+              <a:rPr lang="fr-FR" sz="2400" dirty="0"/>
+              <a:t>… </a:t>
+            </a:r>
+            <a:r>
+              <a:rPr lang="fr-FR" sz="2400" dirty="0" err="1">
+                <a:solidFill>
+                  <a:srgbClr val="FFC000"/>
+                </a:solidFill>
+              </a:rPr>
+              <a:t>then</a:t>
+            </a:r>
+            <a:r>
+              <a:rPr lang="fr-FR" sz="2400" dirty="0">
+                <a:solidFill>
+                  <a:srgbClr val="FFC000"/>
+                </a:solidFill>
+              </a:rPr>
+              <a:t> I can </a:t>
+            </a:r>
+            <a:r>
+              <a:rPr lang="fr-FR" sz="2400" dirty="0" err="1">
+                <a:solidFill>
+                  <a:srgbClr val="FFC000"/>
+                </a:solidFill>
+              </a:rPr>
+              <a:t>organize</a:t>
+            </a:r>
+            <a:r>
+              <a:rPr lang="fr-FR" sz="2400" dirty="0">
+                <a:solidFill>
+                  <a:srgbClr val="FFC000"/>
+                </a:solidFill>
+              </a:rPr>
+              <a:t> the planning and </a:t>
+            </a:r>
+            <a:r>
+              <a:rPr lang="fr-FR" sz="2400" dirty="0" err="1">
+                <a:solidFill>
+                  <a:srgbClr val="FFC000"/>
+                </a:solidFill>
+              </a:rPr>
+              <a:t>resources</a:t>
+            </a:r>
+            <a:r>
+              <a:rPr lang="fr-FR" sz="2400" dirty="0">
+                <a:solidFill>
+                  <a:srgbClr val="FFC000"/>
+                </a:solidFill>
+              </a:rPr>
+              <a:t> </a:t>
+            </a:r>
+            <a:r>
+              <a:rPr lang="fr-FR" sz="2400" dirty="0"/>
+              <a:t>»</a:t>
+            </a:r>
+          </a:p>
+          <a:p>
+            <a:pPr marL="0" indent="0">
+              <a:buNone/>
+            </a:pPr>
+            <a:endParaRPr lang="fr-FR" sz="1000" dirty="0"/>
+          </a:p>
+          <a:p>
+            <a:pPr marL="0" indent="0">
+              <a:buNone/>
+            </a:pPr>
+            <a:r>
+              <a:rPr lang="fr-FR" sz="2400" dirty="0"/>
+              <a:t>« </a:t>
+            </a:r>
+            <a:r>
+              <a:rPr lang="fr-FR" sz="2400" dirty="0">
+                <a:solidFill>
+                  <a:srgbClr val="00B0F0"/>
+                </a:solidFill>
+              </a:rPr>
+              <a:t>As a </a:t>
+            </a:r>
+            <a:r>
+              <a:rPr lang="fr-FR" sz="2400" dirty="0" err="1">
+                <a:solidFill>
+                  <a:srgbClr val="00B0F0"/>
+                </a:solidFill>
+              </a:rPr>
+              <a:t>Clinical</a:t>
+            </a:r>
+            <a:r>
+              <a:rPr lang="fr-FR" sz="2400" dirty="0">
+                <a:solidFill>
+                  <a:srgbClr val="00B0F0"/>
+                </a:solidFill>
+              </a:rPr>
+              <a:t> People Manager, </a:t>
+            </a:r>
+            <a:r>
+              <a:rPr lang="fr-FR" sz="2400" dirty="0"/>
+              <a:t>I </a:t>
+            </a:r>
+            <a:r>
+              <a:rPr lang="fr-FR" sz="2400" dirty="0" err="1"/>
+              <a:t>need</a:t>
+            </a:r>
+            <a:r>
+              <a:rPr lang="fr-FR" sz="2400" dirty="0"/>
+              <a:t> to manage patients and </a:t>
+            </a:r>
+            <a:r>
+              <a:rPr lang="fr-FR" sz="2400" dirty="0" err="1"/>
+              <a:t>physicians</a:t>
+            </a:r>
+            <a:endParaRPr lang="fr-FR" sz="2400" dirty="0"/>
+          </a:p>
+          <a:p>
+            <a:pPr marL="0" indent="0" algn="r">
+              <a:buNone/>
+            </a:pPr>
+            <a:r>
+              <a:rPr lang="fr-FR" sz="2400" dirty="0"/>
+              <a:t>… </a:t>
+            </a:r>
+            <a:r>
+              <a:rPr lang="fr-FR" sz="2400" dirty="0" err="1">
+                <a:solidFill>
+                  <a:srgbClr val="FFC000"/>
+                </a:solidFill>
+              </a:rPr>
+              <a:t>then</a:t>
+            </a:r>
+            <a:r>
+              <a:rPr lang="fr-FR" sz="2400" dirty="0">
+                <a:solidFill>
+                  <a:srgbClr val="FFC000"/>
+                </a:solidFill>
+              </a:rPr>
+              <a:t> I can </a:t>
+            </a:r>
+            <a:r>
+              <a:rPr lang="fr-FR" sz="2400" dirty="0" err="1">
+                <a:solidFill>
+                  <a:srgbClr val="FFC000"/>
+                </a:solidFill>
+              </a:rPr>
+              <a:t>ensure</a:t>
+            </a:r>
+            <a:r>
+              <a:rPr lang="fr-FR" sz="2400" dirty="0">
+                <a:solidFill>
+                  <a:srgbClr val="FFC000"/>
+                </a:solidFill>
+              </a:rPr>
+              <a:t> </a:t>
+            </a:r>
+            <a:r>
+              <a:rPr lang="fr-FR" sz="2400" dirty="0" err="1">
+                <a:solidFill>
+                  <a:srgbClr val="FFC000"/>
+                </a:solidFill>
+              </a:rPr>
+              <a:t>availability</a:t>
+            </a:r>
+            <a:r>
+              <a:rPr lang="fr-FR" sz="2400" dirty="0">
+                <a:solidFill>
+                  <a:srgbClr val="FFC000"/>
+                </a:solidFill>
+              </a:rPr>
+              <a:t> of </a:t>
+            </a:r>
+            <a:r>
+              <a:rPr lang="fr-FR" sz="2400" dirty="0" err="1">
+                <a:solidFill>
+                  <a:srgbClr val="FFC000"/>
+                </a:solidFill>
+              </a:rPr>
+              <a:t>human</a:t>
+            </a:r>
+            <a:r>
+              <a:rPr lang="fr-FR" sz="2400" dirty="0">
+                <a:solidFill>
+                  <a:srgbClr val="FFC000"/>
+                </a:solidFill>
+              </a:rPr>
+              <a:t> </a:t>
+            </a:r>
+            <a:r>
+              <a:rPr lang="fr-FR" sz="2400" dirty="0" err="1">
+                <a:solidFill>
+                  <a:srgbClr val="FFC000"/>
+                </a:solidFill>
+              </a:rPr>
+              <a:t>resources</a:t>
+            </a:r>
+            <a:r>
+              <a:rPr lang="fr-FR" sz="2400" dirty="0"/>
+              <a:t> »</a:t>
+            </a:r>
+          </a:p>
+          <a:p>
+            <a:pPr marL="0" indent="0" algn="r">
+              <a:buNone/>
+            </a:pPr>
+            <a:endParaRPr lang="fr-FR" sz="1000" dirty="0"/>
+          </a:p>
+          <a:p>
+            <a:pPr marL="0" indent="0">
+              <a:buNone/>
+            </a:pPr>
+            <a:r>
+              <a:rPr lang="fr-FR" sz="2400" dirty="0"/>
+              <a:t>« </a:t>
+            </a:r>
+            <a:r>
+              <a:rPr lang="fr-FR" sz="2400" dirty="0">
+                <a:solidFill>
+                  <a:srgbClr val="00B0F0"/>
+                </a:solidFill>
+              </a:rPr>
+              <a:t>As a Global </a:t>
+            </a:r>
+            <a:r>
+              <a:rPr lang="fr-FR" sz="2400" dirty="0" err="1">
+                <a:solidFill>
+                  <a:srgbClr val="00B0F0"/>
+                </a:solidFill>
+              </a:rPr>
+              <a:t>Quality</a:t>
+            </a:r>
+            <a:r>
+              <a:rPr lang="fr-FR" sz="2400" dirty="0">
+                <a:solidFill>
+                  <a:srgbClr val="00B0F0"/>
+                </a:solidFill>
+              </a:rPr>
+              <a:t> Manager, </a:t>
+            </a:r>
+            <a:r>
+              <a:rPr lang="fr-FR" sz="2400" dirty="0"/>
+              <a:t>I </a:t>
+            </a:r>
+            <a:r>
+              <a:rPr lang="fr-FR" sz="2400" dirty="0" err="1"/>
+              <a:t>need</a:t>
+            </a:r>
+            <a:r>
+              <a:rPr lang="fr-FR" sz="2400" dirty="0"/>
+              <a:t> </a:t>
+            </a:r>
+            <a:r>
+              <a:rPr lang="fr-FR" sz="2400" dirty="0" err="1"/>
+              <a:t>users</a:t>
+            </a:r>
+            <a:r>
+              <a:rPr lang="fr-FR" sz="2400" dirty="0"/>
+              <a:t> to have </a:t>
+            </a:r>
+            <a:r>
+              <a:rPr lang="fr-FR" sz="2400" dirty="0" err="1"/>
+              <a:t>dedicated</a:t>
+            </a:r>
+            <a:r>
+              <a:rPr lang="fr-FR" sz="2400" dirty="0"/>
+              <a:t> </a:t>
+            </a:r>
+            <a:r>
+              <a:rPr lang="fr-FR" sz="2400" dirty="0" err="1"/>
+              <a:t>roles</a:t>
+            </a:r>
+            <a:endParaRPr lang="fr-FR" sz="2400" dirty="0"/>
+          </a:p>
+          <a:p>
+            <a:pPr marL="0" indent="0" algn="r">
+              <a:buNone/>
+            </a:pPr>
+            <a:r>
+              <a:rPr lang="fr-FR" sz="2400" dirty="0"/>
+              <a:t>… </a:t>
+            </a:r>
+            <a:r>
+              <a:rPr lang="fr-FR" sz="2400" dirty="0" err="1">
+                <a:solidFill>
+                  <a:srgbClr val="FFC000"/>
+                </a:solidFill>
+              </a:rPr>
+              <a:t>then</a:t>
+            </a:r>
+            <a:r>
+              <a:rPr lang="fr-FR" sz="2400" dirty="0">
+                <a:solidFill>
+                  <a:srgbClr val="FFC000"/>
+                </a:solidFill>
+              </a:rPr>
+              <a:t> I can </a:t>
+            </a:r>
+            <a:r>
+              <a:rPr lang="fr-FR" sz="2400" dirty="0" err="1">
+                <a:solidFill>
+                  <a:srgbClr val="FFC000"/>
+                </a:solidFill>
+              </a:rPr>
+              <a:t>ensure</a:t>
+            </a:r>
+            <a:r>
+              <a:rPr lang="fr-FR" sz="2400" dirty="0">
+                <a:solidFill>
+                  <a:srgbClr val="FFC000"/>
+                </a:solidFill>
+              </a:rPr>
+              <a:t> the compliance of </a:t>
+            </a:r>
+            <a:r>
+              <a:rPr lang="fr-FR" sz="2400" dirty="0" err="1">
+                <a:solidFill>
+                  <a:srgbClr val="FFC000"/>
+                </a:solidFill>
+              </a:rPr>
+              <a:t>my</a:t>
+            </a:r>
+            <a:r>
+              <a:rPr lang="fr-FR" sz="2400" dirty="0">
+                <a:solidFill>
+                  <a:srgbClr val="FFC000"/>
+                </a:solidFill>
+              </a:rPr>
+              <a:t> </a:t>
+            </a:r>
+            <a:r>
+              <a:rPr lang="fr-FR" sz="2400" dirty="0" err="1">
+                <a:solidFill>
+                  <a:srgbClr val="FFC000"/>
+                </a:solidFill>
+              </a:rPr>
+              <a:t>company</a:t>
+            </a:r>
+            <a:r>
+              <a:rPr lang="fr-FR" sz="2400" dirty="0"/>
+              <a:t> »</a:t>
+            </a:r>
+          </a:p>
+          <a:p>
+            <a:pPr marL="0" indent="0" algn="r">
+              <a:buNone/>
+            </a:pPr>
+            <a:endParaRPr lang="fr-FR" sz="1000" dirty="0"/>
+          </a:p>
+          <a:p>
+            <a:pPr marL="0" marR="0" lvl="0" indent="0" algn="l" defTabSz="914400" rtl="0" eaLnBrk="1" fontAlgn="auto" latinLnBrk="0" hangingPunct="1">
+              <a:lnSpc>
+                <a:spcPct val="90000"/>
+              </a:lnSpc>
+              <a:spcBef>
+                <a:spcPts val="1000"/>
+              </a:spcBef>
+              <a:spcAft>
+                <a:spcPts val="0"/>
+              </a:spcAft>
+              <a:buClrTx/>
+              <a:buSzTx/>
+              <a:buFont typeface="Arial" panose="020B0604020202020204" pitchFamily="34" charset="0"/>
+              <a:buNone/>
+              <a:tabLst/>
+              <a:defRPr/>
+            </a:pPr>
+            <a:r>
+              <a:rPr kumimoji="0" lang="fr-FR" sz="2400" b="0" i="0" u="none" strike="noStrike" kern="1200" cap="none" spc="0" normalizeH="0" baseline="0" noProof="0" dirty="0">
+                <a:ln>
+                  <a:noFill/>
+                </a:ln>
+                <a:solidFill>
+                  <a:prstClr val="black"/>
+                </a:solidFill>
+                <a:effectLst/>
+                <a:uLnTx/>
+                <a:uFillTx/>
+                <a:latin typeface="Calibri" panose="020F0502020204030204"/>
+                <a:ea typeface="+mn-ea"/>
+                <a:cs typeface="+mn-cs"/>
+              </a:rPr>
+              <a:t>« </a:t>
+            </a:r>
+            <a:r>
+              <a:rPr kumimoji="0" lang="fr-FR" sz="2400" b="0" i="0" u="none" strike="noStrike" kern="1200" cap="none" spc="0" normalizeH="0" baseline="0" noProof="0" dirty="0">
+                <a:ln>
+                  <a:noFill/>
+                </a:ln>
+                <a:solidFill>
+                  <a:srgbClr val="00B0F0"/>
+                </a:solidFill>
+                <a:effectLst/>
+                <a:uLnTx/>
+                <a:uFillTx/>
+                <a:latin typeface="Calibri" panose="020F0502020204030204"/>
+                <a:ea typeface="+mn-ea"/>
+                <a:cs typeface="+mn-cs"/>
+              </a:rPr>
+              <a:t>As an IT Security Manager, </a:t>
+            </a:r>
+            <a:r>
+              <a:rPr kumimoji="0" lang="fr-FR" sz="2400" b="0" i="0" u="none" strike="noStrike" kern="1200" cap="none" spc="0" normalizeH="0" baseline="0" noProof="0" dirty="0">
+                <a:ln>
+                  <a:noFill/>
+                </a:ln>
+                <a:solidFill>
+                  <a:prstClr val="black"/>
+                </a:solidFill>
+                <a:effectLst/>
+                <a:uLnTx/>
+                <a:uFillTx/>
+                <a:latin typeface="Calibri" panose="020F0502020204030204"/>
+                <a:ea typeface="+mn-ea"/>
+                <a:cs typeface="+mn-cs"/>
+              </a:rPr>
+              <a:t>I </a:t>
+            </a:r>
+            <a:r>
+              <a:rPr kumimoji="0" lang="fr-FR" sz="2400" b="0" i="0" u="none" strike="noStrike" kern="1200" cap="none" spc="0" normalizeH="0" baseline="0" noProof="0" dirty="0" err="1">
+                <a:ln>
+                  <a:noFill/>
+                </a:ln>
+                <a:solidFill>
+                  <a:prstClr val="black"/>
+                </a:solidFill>
+                <a:effectLst/>
+                <a:uLnTx/>
+                <a:uFillTx/>
+                <a:latin typeface="Calibri" panose="020F0502020204030204"/>
+                <a:ea typeface="+mn-ea"/>
+                <a:cs typeface="+mn-cs"/>
+              </a:rPr>
+              <a:t>need</a:t>
+            </a:r>
+            <a:r>
+              <a:rPr kumimoji="0" lang="fr-FR" sz="2400" b="0" i="0" u="none" strike="noStrike" kern="1200" cap="none" spc="0" normalizeH="0" baseline="0" noProof="0" dirty="0">
+                <a:ln>
+                  <a:noFill/>
+                </a:ln>
+                <a:solidFill>
+                  <a:prstClr val="black"/>
+                </a:solidFill>
+                <a:effectLst/>
+                <a:uLnTx/>
+                <a:uFillTx/>
+                <a:latin typeface="Calibri" panose="020F0502020204030204"/>
+                <a:ea typeface="+mn-ea"/>
+                <a:cs typeface="+mn-cs"/>
+              </a:rPr>
+              <a:t> </a:t>
+            </a:r>
+            <a:r>
+              <a:rPr kumimoji="0" lang="fr-FR" sz="2400" b="0" i="0" u="none" strike="noStrike" kern="1200" cap="none" spc="0" normalizeH="0" baseline="0" noProof="0" dirty="0" err="1">
+                <a:ln>
+                  <a:noFill/>
+                </a:ln>
+                <a:solidFill>
+                  <a:prstClr val="black"/>
+                </a:solidFill>
+                <a:effectLst/>
+                <a:uLnTx/>
+                <a:uFillTx/>
+                <a:latin typeface="Calibri" panose="020F0502020204030204"/>
+                <a:ea typeface="+mn-ea"/>
+                <a:cs typeface="+mn-cs"/>
+              </a:rPr>
+              <a:t>users</a:t>
+            </a:r>
+            <a:r>
+              <a:rPr kumimoji="0" lang="fr-FR" sz="2400" b="0" i="0" u="none" strike="noStrike" kern="1200" cap="none" spc="0" normalizeH="0" baseline="0" noProof="0" dirty="0">
+                <a:ln>
+                  <a:noFill/>
+                </a:ln>
+                <a:solidFill>
+                  <a:prstClr val="black"/>
+                </a:solidFill>
+                <a:effectLst/>
+                <a:uLnTx/>
+                <a:uFillTx/>
+                <a:latin typeface="Calibri" panose="020F0502020204030204"/>
+                <a:ea typeface="+mn-ea"/>
+                <a:cs typeface="+mn-cs"/>
+              </a:rPr>
+              <a:t> to </a:t>
+            </a:r>
+            <a:r>
+              <a:rPr kumimoji="0" lang="fr-FR" sz="2400" b="0" i="0" u="none" strike="noStrike" kern="1200" cap="none" spc="0" normalizeH="0" baseline="0" noProof="0" dirty="0" err="1">
+                <a:ln>
+                  <a:noFill/>
+                </a:ln>
+                <a:solidFill>
+                  <a:prstClr val="black"/>
+                </a:solidFill>
+                <a:effectLst/>
+                <a:uLnTx/>
+                <a:uFillTx/>
+                <a:latin typeface="Calibri" panose="020F0502020204030204"/>
+                <a:ea typeface="+mn-ea"/>
+                <a:cs typeface="+mn-cs"/>
+              </a:rPr>
+              <a:t>be</a:t>
+            </a:r>
+            <a:r>
+              <a:rPr kumimoji="0" lang="fr-FR" sz="2400" b="0" i="0" u="none" strike="noStrike" kern="1200" cap="none" spc="0" normalizeH="0" baseline="0" noProof="0" dirty="0">
+                <a:ln>
+                  <a:noFill/>
+                </a:ln>
+                <a:solidFill>
+                  <a:prstClr val="black"/>
+                </a:solidFill>
+                <a:effectLst/>
+                <a:uLnTx/>
+                <a:uFillTx/>
+                <a:latin typeface="Calibri" panose="020F0502020204030204"/>
+                <a:ea typeface="+mn-ea"/>
+                <a:cs typeface="+mn-cs"/>
+              </a:rPr>
+              <a:t> </a:t>
+            </a:r>
+            <a:r>
+              <a:rPr kumimoji="0" lang="fr-FR" sz="2400" b="0" i="0" u="none" strike="noStrike" kern="1200" cap="none" spc="0" normalizeH="0" baseline="0" noProof="0" dirty="0" err="1">
+                <a:ln>
+                  <a:noFill/>
+                </a:ln>
+                <a:solidFill>
+                  <a:prstClr val="black"/>
+                </a:solidFill>
+                <a:effectLst/>
+                <a:uLnTx/>
+                <a:uFillTx/>
+                <a:latin typeface="Calibri" panose="020F0502020204030204"/>
+                <a:ea typeface="+mn-ea"/>
+                <a:cs typeface="+mn-cs"/>
+              </a:rPr>
+              <a:t>loged</a:t>
+            </a:r>
+            <a:r>
+              <a:rPr kumimoji="0" lang="fr-FR" sz="2400" b="0" i="0" u="none" strike="noStrike" kern="1200" cap="none" spc="0" normalizeH="0" baseline="0" noProof="0" dirty="0">
+                <a:ln>
+                  <a:noFill/>
+                </a:ln>
+                <a:solidFill>
+                  <a:prstClr val="black"/>
+                </a:solidFill>
+                <a:effectLst/>
+                <a:uLnTx/>
+                <a:uFillTx/>
+                <a:latin typeface="Calibri" panose="020F0502020204030204"/>
+                <a:ea typeface="+mn-ea"/>
+                <a:cs typeface="+mn-cs"/>
+              </a:rPr>
+              <a:t> </a:t>
+            </a:r>
+            <a:r>
+              <a:rPr kumimoji="0" lang="fr-FR" sz="2400" b="0" i="0" u="none" strike="noStrike" kern="1200" cap="none" spc="0" normalizeH="0" baseline="0" noProof="0" dirty="0" err="1">
+                <a:ln>
+                  <a:noFill/>
+                </a:ln>
+                <a:solidFill>
+                  <a:prstClr val="black"/>
+                </a:solidFill>
+                <a:effectLst/>
+                <a:uLnTx/>
+                <a:uFillTx/>
+                <a:latin typeface="Calibri" panose="020F0502020204030204"/>
+                <a:ea typeface="+mn-ea"/>
+                <a:cs typeface="+mn-cs"/>
+              </a:rPr>
+              <a:t>each</a:t>
+            </a:r>
+            <a:r>
+              <a:rPr kumimoji="0" lang="fr-FR" sz="2400" b="0" i="0" u="none" strike="noStrike" kern="1200" cap="none" spc="0" normalizeH="0" baseline="0" noProof="0" dirty="0">
+                <a:ln>
+                  <a:noFill/>
+                </a:ln>
+                <a:solidFill>
+                  <a:prstClr val="black"/>
+                </a:solidFill>
+                <a:effectLst/>
+                <a:uLnTx/>
+                <a:uFillTx/>
+                <a:latin typeface="Calibri" panose="020F0502020204030204"/>
+                <a:ea typeface="+mn-ea"/>
+                <a:cs typeface="+mn-cs"/>
+              </a:rPr>
+              <a:t> time the application </a:t>
+            </a:r>
+            <a:r>
+              <a:rPr kumimoji="0" lang="fr-FR" sz="2400" b="0" i="0" u="none" strike="noStrike" kern="1200" cap="none" spc="0" normalizeH="0" baseline="0" noProof="0" dirty="0" err="1">
+                <a:ln>
+                  <a:noFill/>
+                </a:ln>
+                <a:solidFill>
+                  <a:prstClr val="black"/>
+                </a:solidFill>
+                <a:effectLst/>
+                <a:uLnTx/>
+                <a:uFillTx/>
+                <a:latin typeface="Calibri" panose="020F0502020204030204"/>
+                <a:ea typeface="+mn-ea"/>
+                <a:cs typeface="+mn-cs"/>
+              </a:rPr>
+              <a:t>is</a:t>
+            </a:r>
+            <a:r>
+              <a:rPr kumimoji="0" lang="fr-FR" sz="2400" b="0" i="0" u="none" strike="noStrike" kern="1200" cap="none" spc="0" normalizeH="0" baseline="0" noProof="0" dirty="0">
+                <a:ln>
+                  <a:noFill/>
+                </a:ln>
+                <a:solidFill>
+                  <a:prstClr val="black"/>
+                </a:solidFill>
+                <a:effectLst/>
+                <a:uLnTx/>
+                <a:uFillTx/>
+                <a:latin typeface="Calibri" panose="020F0502020204030204"/>
+                <a:ea typeface="+mn-ea"/>
+                <a:cs typeface="+mn-cs"/>
+              </a:rPr>
+              <a:t> open …</a:t>
+            </a:r>
+          </a:p>
+          <a:p>
+            <a:pPr marL="0" marR="0" lvl="0" indent="0" algn="r" defTabSz="914400" rtl="0" eaLnBrk="1" fontAlgn="auto" latinLnBrk="0" hangingPunct="1">
+              <a:lnSpc>
+                <a:spcPct val="90000"/>
+              </a:lnSpc>
+              <a:spcBef>
+                <a:spcPts val="1000"/>
+              </a:spcBef>
+              <a:spcAft>
+                <a:spcPts val="0"/>
+              </a:spcAft>
+              <a:buClrTx/>
+              <a:buSzTx/>
+              <a:buFont typeface="Arial" panose="020B0604020202020204" pitchFamily="34" charset="0"/>
+              <a:buNone/>
+              <a:tabLst/>
+              <a:defRPr/>
+            </a:pPr>
+            <a:r>
+              <a:rPr kumimoji="0" lang="fr-FR" sz="2400" b="0" i="0" u="none" strike="noStrike" kern="1200" cap="none" spc="0" normalizeH="0" baseline="0" noProof="0" dirty="0">
+                <a:ln>
+                  <a:noFill/>
+                </a:ln>
+                <a:solidFill>
+                  <a:prstClr val="black"/>
+                </a:solidFill>
+                <a:effectLst/>
+                <a:uLnTx/>
+                <a:uFillTx/>
+                <a:latin typeface="Calibri" panose="020F0502020204030204"/>
+                <a:ea typeface="+mn-ea"/>
+                <a:cs typeface="+mn-cs"/>
+              </a:rPr>
+              <a:t>… </a:t>
+            </a:r>
+            <a:r>
+              <a:rPr kumimoji="0" lang="fr-FR" sz="2400" b="0" i="0" u="none" strike="noStrike" kern="1200" cap="none" spc="0" normalizeH="0" baseline="0" noProof="0" dirty="0" err="1">
+                <a:ln>
+                  <a:noFill/>
+                </a:ln>
+                <a:solidFill>
+                  <a:srgbClr val="FFC000"/>
+                </a:solidFill>
+                <a:effectLst/>
+                <a:uLnTx/>
+                <a:uFillTx/>
+                <a:latin typeface="Calibri" panose="020F0502020204030204"/>
+                <a:ea typeface="+mn-ea"/>
+                <a:cs typeface="+mn-cs"/>
+              </a:rPr>
+              <a:t>then</a:t>
+            </a:r>
+            <a:r>
+              <a:rPr kumimoji="0" lang="fr-FR" sz="2400" b="0" i="0" u="none" strike="noStrike" kern="1200" cap="none" spc="0" normalizeH="0" baseline="0" noProof="0" dirty="0">
+                <a:ln>
+                  <a:noFill/>
+                </a:ln>
+                <a:solidFill>
+                  <a:srgbClr val="FFC000"/>
+                </a:solidFill>
+                <a:effectLst/>
+                <a:uLnTx/>
+                <a:uFillTx/>
+                <a:latin typeface="Calibri" panose="020F0502020204030204"/>
+                <a:ea typeface="+mn-ea"/>
+                <a:cs typeface="+mn-cs"/>
+              </a:rPr>
+              <a:t> </a:t>
+            </a:r>
+            <a:r>
+              <a:rPr kumimoji="0" lang="fr-FR" sz="2400" b="0" i="0" u="none" strike="noStrike" kern="1200" cap="none" spc="0" normalizeH="0" baseline="0" noProof="0" dirty="0" err="1">
+                <a:ln>
+                  <a:noFill/>
+                </a:ln>
+                <a:solidFill>
+                  <a:srgbClr val="FFC000"/>
+                </a:solidFill>
+                <a:effectLst/>
+                <a:uLnTx/>
+                <a:uFillTx/>
+                <a:latin typeface="Calibri" panose="020F0502020204030204"/>
+                <a:ea typeface="+mn-ea"/>
+                <a:cs typeface="+mn-cs"/>
+              </a:rPr>
+              <a:t>only</a:t>
+            </a:r>
+            <a:r>
+              <a:rPr kumimoji="0" lang="fr-FR" sz="2400" b="0" i="0" u="none" strike="noStrike" kern="1200" cap="none" spc="0" normalizeH="0" baseline="0" noProof="0" dirty="0">
+                <a:ln>
+                  <a:noFill/>
+                </a:ln>
+                <a:solidFill>
+                  <a:srgbClr val="FFC000"/>
+                </a:solidFill>
+                <a:effectLst/>
+                <a:uLnTx/>
+                <a:uFillTx/>
+                <a:latin typeface="Calibri" panose="020F0502020204030204"/>
+                <a:ea typeface="+mn-ea"/>
+                <a:cs typeface="+mn-cs"/>
+              </a:rPr>
+              <a:t> </a:t>
+            </a:r>
+            <a:r>
+              <a:rPr kumimoji="0" lang="fr-FR" sz="2400" b="0" i="0" u="none" strike="noStrike" kern="1200" cap="none" spc="0" normalizeH="0" baseline="0" noProof="0" dirty="0" err="1">
+                <a:ln>
+                  <a:noFill/>
+                </a:ln>
+                <a:solidFill>
+                  <a:srgbClr val="FFC000"/>
+                </a:solidFill>
+                <a:effectLst/>
+                <a:uLnTx/>
+                <a:uFillTx/>
+                <a:latin typeface="Calibri" panose="020F0502020204030204"/>
+                <a:ea typeface="+mn-ea"/>
+                <a:cs typeface="+mn-cs"/>
+              </a:rPr>
+              <a:t>autorized</a:t>
+            </a:r>
+            <a:r>
+              <a:rPr kumimoji="0" lang="fr-FR" sz="2400" b="0" i="0" u="none" strike="noStrike" kern="1200" cap="none" spc="0" normalizeH="0" baseline="0" noProof="0" dirty="0">
+                <a:ln>
+                  <a:noFill/>
+                </a:ln>
+                <a:solidFill>
+                  <a:srgbClr val="FFC000"/>
+                </a:solidFill>
+                <a:effectLst/>
+                <a:uLnTx/>
+                <a:uFillTx/>
+                <a:latin typeface="Calibri" panose="020F0502020204030204"/>
+                <a:ea typeface="+mn-ea"/>
+                <a:cs typeface="+mn-cs"/>
+              </a:rPr>
+              <a:t> people can </a:t>
+            </a:r>
+            <a:r>
+              <a:rPr kumimoji="0" lang="fr-FR" sz="2400" b="0" i="0" u="none" strike="noStrike" kern="1200" cap="none" spc="0" normalizeH="0" baseline="0" noProof="0" dirty="0" err="1">
+                <a:ln>
+                  <a:noFill/>
+                </a:ln>
+                <a:solidFill>
+                  <a:srgbClr val="FFC000"/>
+                </a:solidFill>
+                <a:effectLst/>
+                <a:uLnTx/>
+                <a:uFillTx/>
+                <a:latin typeface="Calibri" panose="020F0502020204030204"/>
+                <a:ea typeface="+mn-ea"/>
+                <a:cs typeface="+mn-cs"/>
+              </a:rPr>
+              <a:t>view</a:t>
+            </a:r>
+            <a:r>
+              <a:rPr kumimoji="0" lang="fr-FR" sz="2400" b="0" i="0" u="none" strike="noStrike" kern="1200" cap="none" spc="0" normalizeH="0" baseline="0" noProof="0" dirty="0">
+                <a:ln>
+                  <a:noFill/>
+                </a:ln>
+                <a:solidFill>
+                  <a:srgbClr val="FFC000"/>
+                </a:solidFill>
+                <a:effectLst/>
+                <a:uLnTx/>
+                <a:uFillTx/>
+                <a:latin typeface="Calibri" panose="020F0502020204030204"/>
+                <a:ea typeface="+mn-ea"/>
+                <a:cs typeface="+mn-cs"/>
+              </a:rPr>
+              <a:t> data</a:t>
+            </a:r>
+            <a:r>
+              <a:rPr kumimoji="0" lang="fr-FR" sz="2400" b="0" i="0" u="none" strike="noStrike" kern="1200" cap="none" spc="0" normalizeH="0" baseline="0" noProof="0" dirty="0">
+                <a:ln>
+                  <a:noFill/>
+                </a:ln>
+                <a:solidFill>
+                  <a:prstClr val="black"/>
+                </a:solidFill>
+                <a:effectLst/>
+                <a:uLnTx/>
+                <a:uFillTx/>
+                <a:latin typeface="Calibri" panose="020F0502020204030204"/>
+                <a:ea typeface="+mn-ea"/>
+                <a:cs typeface="+mn-cs"/>
+              </a:rPr>
+              <a:t> »</a:t>
+            </a:r>
+          </a:p>
+          <a:p>
+            <a:pPr marL="0" indent="0" algn="r">
+              <a:buNone/>
+            </a:pPr>
+            <a:endParaRPr lang="fr-FR" sz="1000" dirty="0"/>
+          </a:p>
+          <a:p>
+            <a:pPr marL="0" indent="0" algn="r">
+              <a:buNone/>
+            </a:pPr>
+            <a:endParaRPr lang="fr-FR" sz="2400" dirty="0"/>
+          </a:p>
+          <a:p>
+            <a:pPr marL="0" indent="0">
+              <a:buNone/>
+            </a:pPr>
             <a:endParaRPr lang="fr-FR" dirty="0"/>
           </a:p>
-          <a:p>
-            <a:r>
-              <a:rPr lang="fr-FR" dirty="0"/>
-              <a:t>Contrôle d’entrée</a:t>
-            </a:r>
-          </a:p>
-          <a:p>
-            <a:endParaRPr lang="fr-FR" dirty="0"/>
-          </a:p>
-        </p:txBody>
-      </p:sp>
+        </p:txBody>
+      </p:sp>
+      <p:pic>
+        <p:nvPicPr>
+          <p:cNvPr id="4" name="Image 3">
+            <a:extLst>
+              <a:ext uri="{FF2B5EF4-FFF2-40B4-BE49-F238E27FC236}">
+                <a16:creationId xmlns:a16="http://schemas.microsoft.com/office/drawing/2014/main" id="{33DB2155-674E-2A0A-D517-B2BA87B85916}"/>
+              </a:ext>
+            </a:extLst>
+          </p:cNvPr>
+          <p:cNvPicPr>
+            <a:picLocks noChangeAspect="1"/>
+          </p:cNvPicPr>
+          <p:nvPr/>
+        </p:nvPicPr>
+        <p:blipFill>
+          <a:blip r:embed="rId2">
+            <a:extLst>
+              <a:ext uri="{28A0092B-C50C-407E-A947-70E740481C1C}">
+                <a14:useLocalDpi xmlns:a14="http://schemas.microsoft.com/office/drawing/2010/main" val="0"/>
+              </a:ext>
+            </a:extLst>
+          </a:blip>
+          <a:stretch>
+            <a:fillRect/>
+          </a:stretch>
+        </p:blipFill>
+        <p:spPr>
+          <a:xfrm>
+            <a:off x="9973977" y="359589"/>
+            <a:ext cx="1202754" cy="1202754"/>
+          </a:xfrm>
+          <a:prstGeom prst="rect">
+            <a:avLst/>
+          </a:prstGeom>
+        </p:spPr>
+      </p:pic>
     </p:spTree>
     <p:extLst>
       <p:ext uri="{BB962C8B-B14F-4D97-AF65-F5344CB8AC3E}">
-        <p14:creationId xmlns:p14="http://schemas.microsoft.com/office/powerpoint/2010/main" val="4003993146"/>
+        <p14:creationId xmlns:p14="http://schemas.microsoft.com/office/powerpoint/2010/main" val="178007563"/>
+      </p:ext>
+    </p:extLst>
+  </p:cSld>
+  <p:clrMapOvr>
+    <a:masterClrMapping/>
+  </p:clrMapOvr>
+</p:sld>
+</file>
+
+<file path=ppt/slides/slide3.xml><?xml version="1.0" encoding="utf-8"?>
+<p:sld xmlns:a="http://schemas.openxmlformats.org/drawingml/2006/main" xmlns:r="http://schemas.openxmlformats.org/officeDocument/2006/relationships" xmlns:p="http://schemas.openxmlformats.org/presentationml/2006/main">
+  <p:cSld>
+    <p:spTree>
+      <p:nvGrpSpPr>
+        <p:cNvPr id="1" name=""/>
+        <p:cNvGrpSpPr/>
+        <p:nvPr/>
+      </p:nvGrpSpPr>
+      <p:grpSpPr>
+        <a:xfrm>
+          <a:off x="0" y="0"/>
+          <a:ext cx="0" cy="0"/>
+          <a:chOff x="0" y="0"/>
+          <a:chExt cx="0" cy="0"/>
+        </a:xfrm>
+      </p:grpSpPr>
+      <p:sp>
+        <p:nvSpPr>
+          <p:cNvPr id="2" name="Titre 1">
+            <a:extLst>
+              <a:ext uri="{FF2B5EF4-FFF2-40B4-BE49-F238E27FC236}">
+                <a16:creationId xmlns:a16="http://schemas.microsoft.com/office/drawing/2014/main" id="{8D0BE7B8-BD59-A209-C860-906E75523200}"/>
+              </a:ext>
+            </a:extLst>
+          </p:cNvPr>
+          <p:cNvSpPr>
+            <a:spLocks noGrp="1"/>
+          </p:cNvSpPr>
+          <p:nvPr>
+            <p:ph type="title"/>
+          </p:nvPr>
+        </p:nvSpPr>
+        <p:spPr>
+          <a:xfrm>
+            <a:off x="838200" y="294789"/>
+            <a:ext cx="10515600" cy="1325563"/>
+          </a:xfrm>
+          <a:ln w="19050">
+            <a:solidFill>
+              <a:srgbClr val="00B0F0"/>
+            </a:solidFill>
+          </a:ln>
+        </p:spPr>
+        <p:txBody>
+          <a:bodyPr vert="horz" lIns="91440" tIns="45720" rIns="91440" bIns="45720" rtlCol="0" anchor="ctr">
+            <a:normAutofit/>
+          </a:bodyPr>
+          <a:lstStyle/>
+          <a:p>
+            <a:r>
+              <a:rPr lang="fr-FR" sz="3200" b="1" dirty="0" err="1"/>
+              <a:t>Clinical</a:t>
+            </a:r>
+            <a:r>
+              <a:rPr lang="fr-FR" sz="3200" b="1" dirty="0"/>
+              <a:t> Trial Management</a:t>
+            </a:r>
+            <a:br>
+              <a:rPr lang="fr-FR" sz="3200" b="1" dirty="0"/>
+            </a:br>
+            <a:r>
+              <a:rPr lang="fr-FR" sz="3200" dirty="0"/>
+              <a:t>Architecture</a:t>
+            </a:r>
+          </a:p>
+        </p:txBody>
+      </p:sp>
+      <p:pic>
+        <p:nvPicPr>
+          <p:cNvPr id="4" name="Image 3">
+            <a:extLst>
+              <a:ext uri="{FF2B5EF4-FFF2-40B4-BE49-F238E27FC236}">
+                <a16:creationId xmlns:a16="http://schemas.microsoft.com/office/drawing/2014/main" id="{33DB2155-674E-2A0A-D517-B2BA87B85916}"/>
+              </a:ext>
+            </a:extLst>
+          </p:cNvPr>
+          <p:cNvPicPr>
+            <a:picLocks noChangeAspect="1"/>
+          </p:cNvPicPr>
+          <p:nvPr/>
+        </p:nvPicPr>
+        <p:blipFill>
+          <a:blip r:embed="rId2">
+            <a:extLst>
+              <a:ext uri="{28A0092B-C50C-407E-A947-70E740481C1C}">
+                <a14:useLocalDpi xmlns:a14="http://schemas.microsoft.com/office/drawing/2010/main" val="0"/>
+              </a:ext>
+            </a:extLst>
+          </a:blip>
+          <a:stretch>
+            <a:fillRect/>
+          </a:stretch>
+        </p:blipFill>
+        <p:spPr>
+          <a:xfrm>
+            <a:off x="9973977" y="360569"/>
+            <a:ext cx="1202754" cy="1202754"/>
+          </a:xfrm>
+          <a:prstGeom prst="rect">
+            <a:avLst/>
+          </a:prstGeom>
+        </p:spPr>
+      </p:pic>
+      <p:pic>
+        <p:nvPicPr>
+          <p:cNvPr id="6" name="Graphique 5" descr="Écran avec un remplissage uni">
+            <a:extLst>
+              <a:ext uri="{FF2B5EF4-FFF2-40B4-BE49-F238E27FC236}">
+                <a16:creationId xmlns:a16="http://schemas.microsoft.com/office/drawing/2014/main" id="{22DCF3FE-8A36-F20B-FF2D-E1E444DFDAF6}"/>
+              </a:ext>
+            </a:extLst>
+          </p:cNvPr>
+          <p:cNvPicPr>
+            <a:picLocks noChangeAspect="1"/>
+          </p:cNvPicPr>
+          <p:nvPr/>
+        </p:nvPicPr>
+        <p:blipFill>
+          <a:blip r:embed="rId3">
+            <a:extLst>
+              <a:ext uri="{28A0092B-C50C-407E-A947-70E740481C1C}">
+                <a14:useLocalDpi xmlns:a14="http://schemas.microsoft.com/office/drawing/2010/main" val="0"/>
+              </a:ext>
+              <a:ext uri="{96DAC541-7B7A-43D3-8B79-37D633B846F1}">
+                <asvg:svgBlip xmlns:asvg="http://schemas.microsoft.com/office/drawing/2016/SVG/main" r:embed="rId4"/>
+              </a:ext>
+            </a:extLst>
+          </a:blip>
+          <a:stretch>
+            <a:fillRect/>
+          </a:stretch>
+        </p:blipFill>
+        <p:spPr>
+          <a:xfrm>
+            <a:off x="197694" y="2668272"/>
+            <a:ext cx="1341800" cy="1341800"/>
+          </a:xfrm>
+          <a:prstGeom prst="rect">
+            <a:avLst/>
+          </a:prstGeom>
+        </p:spPr>
+      </p:pic>
+      <p:sp>
+        <p:nvSpPr>
+          <p:cNvPr id="7" name="Rectangle 6">
+            <a:extLst>
+              <a:ext uri="{FF2B5EF4-FFF2-40B4-BE49-F238E27FC236}">
+                <a16:creationId xmlns:a16="http://schemas.microsoft.com/office/drawing/2014/main" id="{9C08F20F-C788-8447-32CB-67A1B9C83948}"/>
+              </a:ext>
+            </a:extLst>
+          </p:cNvPr>
+          <p:cNvSpPr/>
+          <p:nvPr/>
+        </p:nvSpPr>
+        <p:spPr>
+          <a:xfrm>
+            <a:off x="4015252" y="2354400"/>
+            <a:ext cx="2687948" cy="3470400"/>
+          </a:xfrm>
+          <a:prstGeom prst="rect">
+            <a:avLst/>
+          </a:prstGeom>
+          <a:gradFill>
+            <a:gsLst>
+              <a:gs pos="0">
+                <a:schemeClr val="accent1">
+                  <a:lumMod val="5000"/>
+                  <a:lumOff val="95000"/>
+                </a:schemeClr>
+              </a:gs>
+              <a:gs pos="74000">
+                <a:schemeClr val="accent1">
+                  <a:lumMod val="45000"/>
+                  <a:lumOff val="55000"/>
+                </a:schemeClr>
+              </a:gs>
+              <a:gs pos="83000">
+                <a:schemeClr val="accent1">
+                  <a:lumMod val="45000"/>
+                  <a:lumOff val="55000"/>
+                </a:schemeClr>
+              </a:gs>
+              <a:gs pos="100000">
+                <a:schemeClr val="accent1">
+                  <a:lumMod val="30000"/>
+                  <a:lumOff val="70000"/>
+                </a:schemeClr>
+              </a:gs>
+            </a:gsLst>
+            <a:lin ang="5400000" scaled="1"/>
+          </a:gradFill>
+        </p:spPr>
+        <p:style>
+          <a:lnRef idx="2">
+            <a:schemeClr val="accent1">
+              <a:shade val="50000"/>
+            </a:schemeClr>
+          </a:lnRef>
+          <a:fillRef idx="1">
+            <a:schemeClr val="accent1"/>
+          </a:fillRef>
+          <a:effectRef idx="0">
+            <a:schemeClr val="accent1"/>
+          </a:effectRef>
+          <a:fontRef idx="minor">
+            <a:schemeClr val="lt1"/>
+          </a:fontRef>
+        </p:style>
+        <p:txBody>
+          <a:bodyPr rtlCol="0" anchor="t" anchorCtr="0"/>
+          <a:lstStyle/>
+          <a:p>
+            <a:pPr algn="ctr"/>
+            <a:r>
+              <a:rPr lang="fr-FR" sz="2400" b="1" dirty="0">
+                <a:solidFill>
+                  <a:srgbClr val="C00000"/>
+                </a:solidFill>
+              </a:rPr>
+              <a:t>Serveurs </a:t>
+            </a:r>
+          </a:p>
+          <a:p>
+            <a:pPr algn="ctr"/>
+            <a:endParaRPr lang="fr-FR" sz="2400" b="1" dirty="0">
+              <a:solidFill>
+                <a:srgbClr val="C00000"/>
+              </a:solidFill>
+            </a:endParaRPr>
+          </a:p>
+          <a:p>
+            <a:pPr algn="ctr"/>
+            <a:endParaRPr lang="fr-FR" sz="2400" b="1" dirty="0">
+              <a:solidFill>
+                <a:srgbClr val="C00000"/>
+              </a:solidFill>
+            </a:endParaRPr>
+          </a:p>
+          <a:p>
+            <a:pPr algn="ctr"/>
+            <a:endParaRPr lang="fr-FR" sz="2400" b="1" dirty="0">
+              <a:solidFill>
+                <a:srgbClr val="C00000"/>
+              </a:solidFill>
+            </a:endParaRPr>
+          </a:p>
+          <a:p>
+            <a:pPr algn="ctr"/>
+            <a:endParaRPr lang="fr-FR" sz="2400" b="1" dirty="0">
+              <a:solidFill>
+                <a:srgbClr val="C00000"/>
+              </a:solidFill>
+            </a:endParaRPr>
+          </a:p>
+          <a:p>
+            <a:pPr algn="ctr"/>
+            <a:endParaRPr lang="fr-FR" sz="2400" b="1" dirty="0">
+              <a:solidFill>
+                <a:srgbClr val="C00000"/>
+              </a:solidFill>
+            </a:endParaRPr>
+          </a:p>
+        </p:txBody>
+      </p:sp>
+      <p:sp>
+        <p:nvSpPr>
+          <p:cNvPr id="11" name="Rectangle : coins arrondis 10">
+            <a:extLst>
+              <a:ext uri="{FF2B5EF4-FFF2-40B4-BE49-F238E27FC236}">
+                <a16:creationId xmlns:a16="http://schemas.microsoft.com/office/drawing/2014/main" id="{37ABC495-7297-14EE-3CA8-86736E583504}"/>
+              </a:ext>
+            </a:extLst>
+          </p:cNvPr>
+          <p:cNvSpPr/>
+          <p:nvPr/>
+        </p:nvSpPr>
+        <p:spPr>
+          <a:xfrm>
+            <a:off x="4154399" y="2991944"/>
+            <a:ext cx="2392907" cy="694456"/>
+          </a:xfrm>
+          <a:prstGeom prst="roundRect">
+            <a:avLst/>
+          </a:prstGeom>
+          <a:solidFill>
+            <a:schemeClr val="bg1">
+              <a:lumMod val="85000"/>
+            </a:schemeClr>
+          </a:solidFill>
+        </p:spPr>
+        <p:style>
+          <a:lnRef idx="2">
+            <a:schemeClr val="accent1">
+              <a:shade val="50000"/>
+            </a:schemeClr>
+          </a:lnRef>
+          <a:fillRef idx="1">
+            <a:schemeClr val="accent1"/>
+          </a:fillRef>
+          <a:effectRef idx="0">
+            <a:schemeClr val="accent1"/>
+          </a:effectRef>
+          <a:fontRef idx="minor">
+            <a:schemeClr val="lt1"/>
+          </a:fontRef>
+        </p:style>
+        <p:txBody>
+          <a:bodyPr rtlCol="0" anchor="ctr"/>
+          <a:lstStyle/>
+          <a:p>
+            <a:pPr algn="ctr"/>
+            <a:r>
+              <a:rPr lang="fr-FR" sz="1800" b="1" dirty="0">
+                <a:solidFill>
+                  <a:srgbClr val="C00000"/>
+                </a:solidFill>
+              </a:rPr>
+              <a:t>Front</a:t>
+            </a:r>
+          </a:p>
+          <a:p>
+            <a:pPr algn="ctr"/>
+            <a:r>
+              <a:rPr lang="fr-FR" b="1" dirty="0" err="1">
+                <a:solidFill>
+                  <a:srgbClr val="C00000"/>
+                </a:solidFill>
+              </a:rPr>
+              <a:t>React</a:t>
+            </a:r>
+            <a:r>
+              <a:rPr lang="fr-FR" b="1" dirty="0">
+                <a:solidFill>
+                  <a:srgbClr val="C00000"/>
+                </a:solidFill>
+              </a:rPr>
+              <a:t> and </a:t>
+            </a:r>
+            <a:r>
+              <a:rPr lang="fr-FR" b="1" dirty="0" err="1">
+                <a:solidFill>
+                  <a:srgbClr val="C00000"/>
+                </a:solidFill>
+              </a:rPr>
+              <a:t>bootstrap</a:t>
+            </a:r>
+            <a:endParaRPr lang="fr-FR" dirty="0"/>
+          </a:p>
+        </p:txBody>
+      </p:sp>
+      <p:pic>
+        <p:nvPicPr>
+          <p:cNvPr id="13" name="Image 12">
+            <a:extLst>
+              <a:ext uri="{FF2B5EF4-FFF2-40B4-BE49-F238E27FC236}">
+                <a16:creationId xmlns:a16="http://schemas.microsoft.com/office/drawing/2014/main" id="{88B2BA4A-C2D1-08D0-E89B-42E7DABAFE48}"/>
+              </a:ext>
+            </a:extLst>
+          </p:cNvPr>
+          <p:cNvPicPr>
+            <a:picLocks noChangeAspect="1"/>
+          </p:cNvPicPr>
+          <p:nvPr/>
+        </p:nvPicPr>
+        <p:blipFill>
+          <a:blip r:embed="rId5"/>
+          <a:stretch>
+            <a:fillRect/>
+          </a:stretch>
+        </p:blipFill>
+        <p:spPr>
+          <a:xfrm>
+            <a:off x="6096000" y="5275553"/>
+            <a:ext cx="449402" cy="400077"/>
+          </a:xfrm>
+          <a:prstGeom prst="rect">
+            <a:avLst/>
+          </a:prstGeom>
+        </p:spPr>
+      </p:pic>
+      <p:sp>
+        <p:nvSpPr>
+          <p:cNvPr id="14" name="Rectangle : coins arrondis 13">
+            <a:extLst>
+              <a:ext uri="{FF2B5EF4-FFF2-40B4-BE49-F238E27FC236}">
+                <a16:creationId xmlns:a16="http://schemas.microsoft.com/office/drawing/2014/main" id="{467A2ACE-A040-0846-E446-46EE94C0B145}"/>
+              </a:ext>
+            </a:extLst>
+          </p:cNvPr>
+          <p:cNvSpPr/>
+          <p:nvPr/>
+        </p:nvSpPr>
+        <p:spPr>
+          <a:xfrm>
+            <a:off x="4177199" y="4350688"/>
+            <a:ext cx="2392907" cy="694456"/>
+          </a:xfrm>
+          <a:prstGeom prst="roundRect">
+            <a:avLst/>
+          </a:prstGeom>
+          <a:solidFill>
+            <a:schemeClr val="bg1">
+              <a:lumMod val="85000"/>
+            </a:schemeClr>
+          </a:solidFill>
+        </p:spPr>
+        <p:style>
+          <a:lnRef idx="2">
+            <a:schemeClr val="accent1">
+              <a:shade val="50000"/>
+            </a:schemeClr>
+          </a:lnRef>
+          <a:fillRef idx="1">
+            <a:schemeClr val="accent1"/>
+          </a:fillRef>
+          <a:effectRef idx="0">
+            <a:schemeClr val="accent1"/>
+          </a:effectRef>
+          <a:fontRef idx="minor">
+            <a:schemeClr val="lt1"/>
+          </a:fontRef>
+        </p:style>
+        <p:txBody>
+          <a:bodyPr rtlCol="0" anchor="ctr"/>
+          <a:lstStyle/>
+          <a:p>
+            <a:pPr algn="ctr"/>
+            <a:r>
+              <a:rPr lang="fr-FR" b="1" dirty="0">
+                <a:solidFill>
+                  <a:srgbClr val="C00000"/>
+                </a:solidFill>
+              </a:rPr>
+              <a:t>Back</a:t>
+            </a:r>
+            <a:endParaRPr lang="fr-FR" sz="1800" b="1" dirty="0">
+              <a:solidFill>
+                <a:srgbClr val="C00000"/>
+              </a:solidFill>
+            </a:endParaRPr>
+          </a:p>
+          <a:p>
+            <a:pPr algn="ctr"/>
+            <a:r>
+              <a:rPr lang="fr-FR" b="1" dirty="0" err="1">
+                <a:solidFill>
+                  <a:srgbClr val="C00000"/>
+                </a:solidFill>
+              </a:rPr>
+              <a:t>ExpressJS</a:t>
+            </a:r>
+            <a:endParaRPr lang="fr-FR" dirty="0"/>
+          </a:p>
+        </p:txBody>
+      </p:sp>
+      <p:sp>
+        <p:nvSpPr>
+          <p:cNvPr id="15" name="Rectangle 14">
+            <a:extLst>
+              <a:ext uri="{FF2B5EF4-FFF2-40B4-BE49-F238E27FC236}">
+                <a16:creationId xmlns:a16="http://schemas.microsoft.com/office/drawing/2014/main" id="{4FCD15B9-5277-8C3A-5150-689B5E864943}"/>
+              </a:ext>
+            </a:extLst>
+          </p:cNvPr>
+          <p:cNvSpPr/>
+          <p:nvPr/>
+        </p:nvSpPr>
+        <p:spPr>
+          <a:xfrm>
+            <a:off x="8326801" y="3326400"/>
+            <a:ext cx="2687948" cy="2932288"/>
+          </a:xfrm>
+          <a:prstGeom prst="rect">
+            <a:avLst/>
+          </a:prstGeom>
+          <a:gradFill>
+            <a:gsLst>
+              <a:gs pos="0">
+                <a:schemeClr val="accent1">
+                  <a:lumMod val="5000"/>
+                  <a:lumOff val="95000"/>
+                </a:schemeClr>
+              </a:gs>
+              <a:gs pos="74000">
+                <a:schemeClr val="accent1">
+                  <a:lumMod val="45000"/>
+                  <a:lumOff val="55000"/>
+                </a:schemeClr>
+              </a:gs>
+              <a:gs pos="83000">
+                <a:schemeClr val="accent1">
+                  <a:lumMod val="45000"/>
+                  <a:lumOff val="55000"/>
+                </a:schemeClr>
+              </a:gs>
+              <a:gs pos="100000">
+                <a:schemeClr val="accent1">
+                  <a:lumMod val="30000"/>
+                  <a:lumOff val="70000"/>
+                </a:schemeClr>
+              </a:gs>
+            </a:gsLst>
+            <a:lin ang="5400000" scaled="1"/>
+          </a:gradFill>
+        </p:spPr>
+        <p:style>
+          <a:lnRef idx="2">
+            <a:schemeClr val="accent1">
+              <a:shade val="50000"/>
+            </a:schemeClr>
+          </a:lnRef>
+          <a:fillRef idx="1">
+            <a:schemeClr val="accent1"/>
+          </a:fillRef>
+          <a:effectRef idx="0">
+            <a:schemeClr val="accent1"/>
+          </a:effectRef>
+          <a:fontRef idx="minor">
+            <a:schemeClr val="lt1"/>
+          </a:fontRef>
+        </p:style>
+        <p:txBody>
+          <a:bodyPr rtlCol="0" anchor="t" anchorCtr="0"/>
+          <a:lstStyle/>
+          <a:p>
+            <a:pPr algn="ctr"/>
+            <a:r>
+              <a:rPr lang="fr-FR" sz="2400" b="1" dirty="0" err="1">
+                <a:solidFill>
+                  <a:srgbClr val="C00000"/>
+                </a:solidFill>
+              </a:rPr>
+              <a:t>Database</a:t>
+            </a:r>
+            <a:r>
+              <a:rPr lang="fr-FR" sz="2400" b="1" dirty="0">
+                <a:solidFill>
+                  <a:srgbClr val="C00000"/>
+                </a:solidFill>
+              </a:rPr>
+              <a:t> </a:t>
+            </a:r>
+          </a:p>
+          <a:p>
+            <a:pPr algn="ctr"/>
+            <a:endParaRPr lang="fr-FR" sz="2400" b="1" dirty="0">
+              <a:solidFill>
+                <a:srgbClr val="C00000"/>
+              </a:solidFill>
+            </a:endParaRPr>
+          </a:p>
+          <a:p>
+            <a:pPr algn="ctr"/>
+            <a:endParaRPr lang="fr-FR" sz="2400" b="1" dirty="0">
+              <a:solidFill>
+                <a:srgbClr val="C00000"/>
+              </a:solidFill>
+            </a:endParaRPr>
+          </a:p>
+          <a:p>
+            <a:pPr algn="ctr"/>
+            <a:endParaRPr lang="fr-FR" sz="2400" b="1" dirty="0">
+              <a:solidFill>
+                <a:srgbClr val="C00000"/>
+              </a:solidFill>
+            </a:endParaRPr>
+          </a:p>
+          <a:p>
+            <a:pPr algn="ctr"/>
+            <a:endParaRPr lang="fr-FR" sz="2400" b="1" dirty="0">
+              <a:solidFill>
+                <a:srgbClr val="C00000"/>
+              </a:solidFill>
+            </a:endParaRPr>
+          </a:p>
+          <a:p>
+            <a:pPr algn="ctr"/>
+            <a:endParaRPr lang="fr-FR" sz="2400" b="1" dirty="0">
+              <a:solidFill>
+                <a:srgbClr val="C00000"/>
+              </a:solidFill>
+            </a:endParaRPr>
+          </a:p>
+        </p:txBody>
+      </p:sp>
+      <p:sp>
+        <p:nvSpPr>
+          <p:cNvPr id="16" name="Rectangle : coins arrondis 15">
+            <a:extLst>
+              <a:ext uri="{FF2B5EF4-FFF2-40B4-BE49-F238E27FC236}">
+                <a16:creationId xmlns:a16="http://schemas.microsoft.com/office/drawing/2014/main" id="{6A705D41-A0F5-22EE-F354-1D701E4EC34B}"/>
+              </a:ext>
+            </a:extLst>
+          </p:cNvPr>
+          <p:cNvSpPr/>
+          <p:nvPr/>
+        </p:nvSpPr>
+        <p:spPr>
+          <a:xfrm>
+            <a:off x="8465948" y="4289832"/>
+            <a:ext cx="2392907" cy="928800"/>
+          </a:xfrm>
+          <a:prstGeom prst="roundRect">
+            <a:avLst/>
+          </a:prstGeom>
+          <a:solidFill>
+            <a:schemeClr val="bg1">
+              <a:lumMod val="85000"/>
+            </a:schemeClr>
+          </a:solidFill>
+        </p:spPr>
+        <p:style>
+          <a:lnRef idx="2">
+            <a:schemeClr val="accent1">
+              <a:shade val="50000"/>
+            </a:schemeClr>
+          </a:lnRef>
+          <a:fillRef idx="1">
+            <a:schemeClr val="accent1"/>
+          </a:fillRef>
+          <a:effectRef idx="0">
+            <a:schemeClr val="accent1"/>
+          </a:effectRef>
+          <a:fontRef idx="minor">
+            <a:schemeClr val="lt1"/>
+          </a:fontRef>
+        </p:style>
+        <p:txBody>
+          <a:bodyPr rtlCol="0" anchor="ctr"/>
+          <a:lstStyle/>
+          <a:p>
+            <a:pPr algn="ctr"/>
+            <a:r>
+              <a:rPr lang="fr-FR" b="1" dirty="0">
+                <a:solidFill>
+                  <a:srgbClr val="C00000"/>
+                </a:solidFill>
+              </a:rPr>
+              <a:t>MySQL</a:t>
+            </a:r>
+          </a:p>
+        </p:txBody>
+      </p:sp>
+      <p:pic>
+        <p:nvPicPr>
+          <p:cNvPr id="1028" name="Picture 4" descr="Résultat d’images pour apple logo">
+            <a:extLst>
+              <a:ext uri="{FF2B5EF4-FFF2-40B4-BE49-F238E27FC236}">
+                <a16:creationId xmlns:a16="http://schemas.microsoft.com/office/drawing/2014/main" id="{5A3392A8-CA25-9F0D-F3A5-5D13930ECF27}"/>
+              </a:ext>
+            </a:extLst>
+          </p:cNvPr>
+          <p:cNvPicPr>
+            <a:picLocks noChangeAspect="1" noChangeArrowheads="1"/>
+          </p:cNvPicPr>
+          <p:nvPr/>
+        </p:nvPicPr>
+        <p:blipFill rotWithShape="1">
+          <a:blip r:embed="rId6">
+            <a:extLst>
+              <a:ext uri="{28A0092B-C50C-407E-A947-70E740481C1C}">
+                <a14:useLocalDpi xmlns:a14="http://schemas.microsoft.com/office/drawing/2010/main" val="0"/>
+              </a:ext>
+            </a:extLst>
+          </a:blip>
+          <a:srcRect l="24911" r="27044" b="539"/>
+          <a:stretch/>
+        </p:blipFill>
+        <p:spPr bwMode="auto">
+          <a:xfrm>
+            <a:off x="10400773" y="5595432"/>
+            <a:ext cx="458081" cy="534428"/>
+          </a:xfrm>
+          <a:prstGeom prst="rect">
+            <a:avLst/>
+          </a:prstGeom>
+          <a:noFill/>
+          <a:extLst>
+            <a:ext uri="{909E8E84-426E-40DD-AFC4-6F175D3DCCD1}">
+              <a14:hiddenFill xmlns:a14="http://schemas.microsoft.com/office/drawing/2010/main">
+                <a:solidFill>
+                  <a:srgbClr val="FFFFFF"/>
+                </a:solidFill>
+              </a14:hiddenFill>
+            </a:ext>
+          </a:extLst>
+        </p:spPr>
+      </p:pic>
+      <p:cxnSp>
+        <p:nvCxnSpPr>
+          <p:cNvPr id="20" name="Connecteur droit avec flèche 19">
+            <a:extLst>
+              <a:ext uri="{FF2B5EF4-FFF2-40B4-BE49-F238E27FC236}">
+                <a16:creationId xmlns:a16="http://schemas.microsoft.com/office/drawing/2014/main" id="{CD717EB3-8DC7-A755-F6F5-F9D94DE1177F}"/>
+              </a:ext>
+            </a:extLst>
+          </p:cNvPr>
+          <p:cNvCxnSpPr>
+            <a:cxnSpLocks/>
+          </p:cNvCxnSpPr>
+          <p:nvPr/>
+        </p:nvCxnSpPr>
+        <p:spPr>
+          <a:xfrm>
+            <a:off x="1539494" y="3483172"/>
+            <a:ext cx="2528506" cy="0"/>
+          </a:xfrm>
+          <a:prstGeom prst="straightConnector1">
+            <a:avLst/>
+          </a:prstGeom>
+          <a:ln w="28575">
+            <a:tailEnd type="stealth" w="lg" len="lg"/>
+          </a:ln>
+        </p:spPr>
+        <p:style>
+          <a:lnRef idx="1">
+            <a:schemeClr val="accent1"/>
+          </a:lnRef>
+          <a:fillRef idx="0">
+            <a:schemeClr val="accent1"/>
+          </a:fillRef>
+          <a:effectRef idx="0">
+            <a:schemeClr val="accent1"/>
+          </a:effectRef>
+          <a:fontRef idx="minor">
+            <a:schemeClr val="tx1"/>
+          </a:fontRef>
+        </p:style>
+      </p:cxnSp>
+      <p:cxnSp>
+        <p:nvCxnSpPr>
+          <p:cNvPr id="22" name="Connecteur droit avec flèche 21">
+            <a:extLst>
+              <a:ext uri="{FF2B5EF4-FFF2-40B4-BE49-F238E27FC236}">
+                <a16:creationId xmlns:a16="http://schemas.microsoft.com/office/drawing/2014/main" id="{628ADB60-78CA-C843-08F5-389BDEA6BFBC}"/>
+              </a:ext>
+            </a:extLst>
+          </p:cNvPr>
+          <p:cNvCxnSpPr>
+            <a:cxnSpLocks/>
+          </p:cNvCxnSpPr>
+          <p:nvPr/>
+        </p:nvCxnSpPr>
+        <p:spPr>
+          <a:xfrm flipH="1">
+            <a:off x="1539494" y="3204000"/>
+            <a:ext cx="2528506" cy="0"/>
+          </a:xfrm>
+          <a:prstGeom prst="straightConnector1">
+            <a:avLst/>
+          </a:prstGeom>
+          <a:ln w="28575">
+            <a:tailEnd type="stealth" w="lg" len="lg"/>
+          </a:ln>
+        </p:spPr>
+        <p:style>
+          <a:lnRef idx="1">
+            <a:schemeClr val="accent1"/>
+          </a:lnRef>
+          <a:fillRef idx="0">
+            <a:schemeClr val="accent1"/>
+          </a:fillRef>
+          <a:effectRef idx="0">
+            <a:schemeClr val="accent1"/>
+          </a:effectRef>
+          <a:fontRef idx="minor">
+            <a:schemeClr val="tx1"/>
+          </a:fontRef>
+        </p:style>
+      </p:cxnSp>
+      <p:cxnSp>
+        <p:nvCxnSpPr>
+          <p:cNvPr id="29" name="Connecteur droit avec flèche 28">
+            <a:extLst>
+              <a:ext uri="{FF2B5EF4-FFF2-40B4-BE49-F238E27FC236}">
+                <a16:creationId xmlns:a16="http://schemas.microsoft.com/office/drawing/2014/main" id="{8EB6FE83-0227-52CD-EB9D-1C85113541D2}"/>
+              </a:ext>
+            </a:extLst>
+          </p:cNvPr>
+          <p:cNvCxnSpPr>
+            <a:cxnSpLocks/>
+          </p:cNvCxnSpPr>
+          <p:nvPr/>
+        </p:nvCxnSpPr>
+        <p:spPr>
+          <a:xfrm>
+            <a:off x="4694294" y="3686400"/>
+            <a:ext cx="0" cy="660688"/>
+          </a:xfrm>
+          <a:prstGeom prst="straightConnector1">
+            <a:avLst/>
+          </a:prstGeom>
+          <a:ln w="28575">
+            <a:tailEnd type="stealth" w="lg" len="lg"/>
+          </a:ln>
+        </p:spPr>
+        <p:style>
+          <a:lnRef idx="1">
+            <a:schemeClr val="accent1"/>
+          </a:lnRef>
+          <a:fillRef idx="0">
+            <a:schemeClr val="accent1"/>
+          </a:fillRef>
+          <a:effectRef idx="0">
+            <a:schemeClr val="accent1"/>
+          </a:effectRef>
+          <a:fontRef idx="minor">
+            <a:schemeClr val="tx1"/>
+          </a:fontRef>
+        </p:style>
+      </p:cxnSp>
+      <p:cxnSp>
+        <p:nvCxnSpPr>
+          <p:cNvPr id="31" name="Connecteur droit avec flèche 30">
+            <a:extLst>
+              <a:ext uri="{FF2B5EF4-FFF2-40B4-BE49-F238E27FC236}">
+                <a16:creationId xmlns:a16="http://schemas.microsoft.com/office/drawing/2014/main" id="{F6199D23-9A9C-C70C-563C-2B20B3AE0E4B}"/>
+              </a:ext>
+            </a:extLst>
+          </p:cNvPr>
+          <p:cNvCxnSpPr>
+            <a:cxnSpLocks/>
+          </p:cNvCxnSpPr>
+          <p:nvPr/>
+        </p:nvCxnSpPr>
+        <p:spPr>
+          <a:xfrm flipV="1">
+            <a:off x="5933894" y="3686400"/>
+            <a:ext cx="0" cy="704728"/>
+          </a:xfrm>
+          <a:prstGeom prst="straightConnector1">
+            <a:avLst/>
+          </a:prstGeom>
+          <a:ln w="28575">
+            <a:tailEnd type="stealth" w="lg" len="lg"/>
+          </a:ln>
+        </p:spPr>
+        <p:style>
+          <a:lnRef idx="1">
+            <a:schemeClr val="accent1"/>
+          </a:lnRef>
+          <a:fillRef idx="0">
+            <a:schemeClr val="accent1"/>
+          </a:fillRef>
+          <a:effectRef idx="0">
+            <a:schemeClr val="accent1"/>
+          </a:effectRef>
+          <a:fontRef idx="minor">
+            <a:schemeClr val="tx1"/>
+          </a:fontRef>
+        </p:style>
+      </p:cxnSp>
+      <p:cxnSp>
+        <p:nvCxnSpPr>
+          <p:cNvPr id="33" name="Connecteur droit avec flèche 32">
+            <a:extLst>
+              <a:ext uri="{FF2B5EF4-FFF2-40B4-BE49-F238E27FC236}">
+                <a16:creationId xmlns:a16="http://schemas.microsoft.com/office/drawing/2014/main" id="{74219DB5-240C-92BF-DA84-79C13F3408AE}"/>
+              </a:ext>
+            </a:extLst>
+          </p:cNvPr>
+          <p:cNvCxnSpPr>
+            <a:cxnSpLocks/>
+          </p:cNvCxnSpPr>
+          <p:nvPr/>
+        </p:nvCxnSpPr>
+        <p:spPr>
+          <a:xfrm>
+            <a:off x="6570106" y="4896000"/>
+            <a:ext cx="1895842" cy="0"/>
+          </a:xfrm>
+          <a:prstGeom prst="straightConnector1">
+            <a:avLst/>
+          </a:prstGeom>
+          <a:ln w="28575">
+            <a:tailEnd type="stealth" w="lg" len="lg"/>
+          </a:ln>
+        </p:spPr>
+        <p:style>
+          <a:lnRef idx="1">
+            <a:schemeClr val="accent1"/>
+          </a:lnRef>
+          <a:fillRef idx="0">
+            <a:schemeClr val="accent1"/>
+          </a:fillRef>
+          <a:effectRef idx="0">
+            <a:schemeClr val="accent1"/>
+          </a:effectRef>
+          <a:fontRef idx="minor">
+            <a:schemeClr val="tx1"/>
+          </a:fontRef>
+        </p:style>
+      </p:cxnSp>
+      <p:cxnSp>
+        <p:nvCxnSpPr>
+          <p:cNvPr id="37" name="Connecteur droit avec flèche 36">
+            <a:extLst>
+              <a:ext uri="{FF2B5EF4-FFF2-40B4-BE49-F238E27FC236}">
+                <a16:creationId xmlns:a16="http://schemas.microsoft.com/office/drawing/2014/main" id="{954823CE-BC47-532C-8627-67040326A08C}"/>
+              </a:ext>
+            </a:extLst>
+          </p:cNvPr>
+          <p:cNvCxnSpPr>
+            <a:cxnSpLocks/>
+          </p:cNvCxnSpPr>
+          <p:nvPr/>
+        </p:nvCxnSpPr>
+        <p:spPr>
+          <a:xfrm flipH="1">
+            <a:off x="6612937" y="4523488"/>
+            <a:ext cx="1713864" cy="0"/>
+          </a:xfrm>
+          <a:prstGeom prst="straightConnector1">
+            <a:avLst/>
+          </a:prstGeom>
+          <a:ln w="28575">
+            <a:tailEnd type="stealth" w="lg" len="lg"/>
+          </a:ln>
+        </p:spPr>
+        <p:style>
+          <a:lnRef idx="1">
+            <a:schemeClr val="accent1"/>
+          </a:lnRef>
+          <a:fillRef idx="0">
+            <a:schemeClr val="accent1"/>
+          </a:fillRef>
+          <a:effectRef idx="0">
+            <a:schemeClr val="accent1"/>
+          </a:effectRef>
+          <a:fontRef idx="minor">
+            <a:schemeClr val="tx1"/>
+          </a:fontRef>
+        </p:style>
+      </p:cxnSp>
+      <p:sp>
+        <p:nvSpPr>
+          <p:cNvPr id="10" name="ZoneTexte 9">
+            <a:extLst>
+              <a:ext uri="{FF2B5EF4-FFF2-40B4-BE49-F238E27FC236}">
+                <a16:creationId xmlns:a16="http://schemas.microsoft.com/office/drawing/2014/main" id="{736CC1AB-FAA2-91C0-C299-BDCB7F69289A}"/>
+              </a:ext>
+            </a:extLst>
+          </p:cNvPr>
+          <p:cNvSpPr txBox="1"/>
+          <p:nvPr/>
+        </p:nvSpPr>
+        <p:spPr>
+          <a:xfrm>
+            <a:off x="458194" y="3920500"/>
+            <a:ext cx="820800" cy="369332"/>
+          </a:xfrm>
+          <a:prstGeom prst="rect">
+            <a:avLst/>
+          </a:prstGeom>
+          <a:noFill/>
+        </p:spPr>
+        <p:txBody>
+          <a:bodyPr wrap="square" rtlCol="0">
+            <a:spAutoFit/>
+          </a:bodyPr>
+          <a:lstStyle/>
+          <a:p>
+            <a:r>
+              <a:rPr lang="fr-FR" b="1" dirty="0"/>
+              <a:t>Clients</a:t>
+            </a:r>
+          </a:p>
+        </p:txBody>
+      </p:sp>
+    </p:spTree>
+    <p:extLst>
+      <p:ext uri="{BB962C8B-B14F-4D97-AF65-F5344CB8AC3E}">
+        <p14:creationId xmlns:p14="http://schemas.microsoft.com/office/powerpoint/2010/main" val="994227574"/>
+      </p:ext>
+    </p:extLst>
+  </p:cSld>
+  <p:clrMapOvr>
+    <a:masterClrMapping/>
+  </p:clrMapOvr>
+</p:sld>
+</file>
+
+<file path=ppt/slides/slide4.xml><?xml version="1.0" encoding="utf-8"?>
+<p:sld xmlns:a="http://schemas.openxmlformats.org/drawingml/2006/main" xmlns:r="http://schemas.openxmlformats.org/officeDocument/2006/relationships" xmlns:p="http://schemas.openxmlformats.org/presentationml/2006/main">
+  <p:cSld>
+    <p:spTree>
+      <p:nvGrpSpPr>
+        <p:cNvPr id="1" name=""/>
+        <p:cNvGrpSpPr/>
+        <p:nvPr/>
+      </p:nvGrpSpPr>
+      <p:grpSpPr>
+        <a:xfrm>
+          <a:off x="0" y="0"/>
+          <a:ext cx="0" cy="0"/>
+          <a:chOff x="0" y="0"/>
+          <a:chExt cx="0" cy="0"/>
+        </a:xfrm>
+      </p:grpSpPr>
+      <p:sp>
+        <p:nvSpPr>
+          <p:cNvPr id="43" name="ZoneTexte 42">
+            <a:extLst>
+              <a:ext uri="{FF2B5EF4-FFF2-40B4-BE49-F238E27FC236}">
+                <a16:creationId xmlns:a16="http://schemas.microsoft.com/office/drawing/2014/main" id="{4997F630-0B93-5F24-49B7-F5858B5CC29E}"/>
+              </a:ext>
+            </a:extLst>
+          </p:cNvPr>
+          <p:cNvSpPr txBox="1"/>
+          <p:nvPr/>
+        </p:nvSpPr>
+        <p:spPr>
+          <a:xfrm>
+            <a:off x="3575400" y="4730963"/>
+            <a:ext cx="5097600" cy="1200329"/>
+          </a:xfrm>
+          <a:prstGeom prst="rect">
+            <a:avLst/>
+          </a:prstGeom>
+          <a:noFill/>
+          <a:ln w="12700">
+            <a:solidFill>
+              <a:srgbClr val="00B0F0"/>
+            </a:solidFill>
+          </a:ln>
+        </p:spPr>
+        <p:txBody>
+          <a:bodyPr wrap="square" rtlCol="0" anchor="ctr" anchorCtr="0">
+            <a:spAutoFit/>
+          </a:bodyPr>
+          <a:lstStyle/>
+          <a:p>
+            <a:pPr marL="0" marR="0" lvl="0" indent="0" algn="l" defTabSz="914400" rtl="0" eaLnBrk="1" fontAlgn="auto" latinLnBrk="0" hangingPunct="1">
+              <a:lnSpc>
+                <a:spcPct val="100000"/>
+              </a:lnSpc>
+              <a:spcBef>
+                <a:spcPts val="0"/>
+              </a:spcBef>
+              <a:spcAft>
+                <a:spcPts val="0"/>
+              </a:spcAft>
+              <a:buClrTx/>
+              <a:buSzTx/>
+              <a:buFontTx/>
+              <a:buNone/>
+              <a:tabLst/>
+              <a:defRPr/>
+            </a:pPr>
+            <a:endParaRPr kumimoji="0" lang="fr-FR" sz="1200" b="0" i="0" u="none" strike="noStrike" kern="1200" cap="none" spc="0" normalizeH="0" baseline="0" noProof="0" dirty="0">
+              <a:ln>
+                <a:noFill/>
+              </a:ln>
+              <a:solidFill>
+                <a:prstClr val="black"/>
+              </a:solidFill>
+              <a:effectLst/>
+              <a:uLnTx/>
+              <a:uFillTx/>
+              <a:latin typeface="Calibri" panose="020F0502020204030204"/>
+              <a:ea typeface="+mn-ea"/>
+              <a:cs typeface="+mn-cs"/>
+            </a:endParaRPr>
+          </a:p>
+          <a:p>
+            <a:pPr marL="0" marR="0" lvl="0" indent="0" algn="l" defTabSz="914400" rtl="0" eaLnBrk="1" fontAlgn="auto" latinLnBrk="0" hangingPunct="1">
+              <a:lnSpc>
+                <a:spcPct val="100000"/>
+              </a:lnSpc>
+              <a:spcBef>
+                <a:spcPts val="0"/>
+              </a:spcBef>
+              <a:spcAft>
+                <a:spcPts val="0"/>
+              </a:spcAft>
+              <a:buClrTx/>
+              <a:buSzTx/>
+              <a:buFontTx/>
+              <a:buNone/>
+              <a:tabLst/>
+              <a:defRPr/>
+            </a:pPr>
+            <a:endParaRPr kumimoji="0" lang="fr-FR" sz="1200" b="0" i="0" u="none" strike="noStrike" kern="1200" cap="none" spc="0" normalizeH="0" baseline="0" noProof="0" dirty="0">
+              <a:ln>
+                <a:noFill/>
+              </a:ln>
+              <a:solidFill>
+                <a:prstClr val="black"/>
+              </a:solidFill>
+              <a:effectLst/>
+              <a:uLnTx/>
+              <a:uFillTx/>
+              <a:latin typeface="Calibri" panose="020F0502020204030204"/>
+              <a:ea typeface="+mn-ea"/>
+              <a:cs typeface="+mn-cs"/>
+            </a:endParaRPr>
+          </a:p>
+          <a:p>
+            <a:pPr marL="0" marR="0" lvl="0" indent="0" algn="l" defTabSz="914400" rtl="0" eaLnBrk="1" fontAlgn="auto" latinLnBrk="0" hangingPunct="1">
+              <a:lnSpc>
+                <a:spcPct val="100000"/>
+              </a:lnSpc>
+              <a:spcBef>
+                <a:spcPts val="0"/>
+              </a:spcBef>
+              <a:spcAft>
+                <a:spcPts val="0"/>
+              </a:spcAft>
+              <a:buClrTx/>
+              <a:buSzTx/>
+              <a:buFontTx/>
+              <a:buNone/>
+              <a:tabLst/>
+              <a:defRPr/>
+            </a:pPr>
+            <a:r>
+              <a:rPr kumimoji="0" lang="fr-FR" sz="2400" b="0" i="0" u="none" strike="noStrike" kern="1200" cap="none" spc="0" normalizeH="0" baseline="0" noProof="0" dirty="0">
+                <a:ln>
+                  <a:noFill/>
+                </a:ln>
+                <a:solidFill>
+                  <a:prstClr val="black"/>
+                </a:solidFill>
+                <a:effectLst/>
+                <a:uLnTx/>
+                <a:uFillTx/>
+                <a:latin typeface="Calibri" panose="020F0502020204030204"/>
+                <a:ea typeface="+mn-ea"/>
+                <a:cs typeface="+mn-cs"/>
+              </a:rPr>
+              <a:t>MySQL</a:t>
+            </a:r>
+          </a:p>
+          <a:p>
+            <a:pPr marL="0" marR="0" lvl="0" indent="0" algn="l" defTabSz="914400" rtl="0" eaLnBrk="1" fontAlgn="auto" latinLnBrk="0" hangingPunct="1">
+              <a:lnSpc>
+                <a:spcPct val="100000"/>
+              </a:lnSpc>
+              <a:spcBef>
+                <a:spcPts val="0"/>
+              </a:spcBef>
+              <a:spcAft>
+                <a:spcPts val="0"/>
+              </a:spcAft>
+              <a:buClrTx/>
+              <a:buSzTx/>
+              <a:buFontTx/>
+              <a:buNone/>
+              <a:tabLst/>
+              <a:defRPr/>
+            </a:pPr>
+            <a:endParaRPr kumimoji="0" lang="fr-FR" sz="1200" b="0" i="0" u="none" strike="noStrike" kern="1200" cap="none" spc="0" normalizeH="0" baseline="0" noProof="0" dirty="0">
+              <a:ln>
+                <a:noFill/>
+              </a:ln>
+              <a:solidFill>
+                <a:prstClr val="black"/>
+              </a:solidFill>
+              <a:effectLst/>
+              <a:uLnTx/>
+              <a:uFillTx/>
+              <a:latin typeface="Calibri" panose="020F0502020204030204"/>
+              <a:ea typeface="+mn-ea"/>
+              <a:cs typeface="+mn-cs"/>
+            </a:endParaRPr>
+          </a:p>
+          <a:p>
+            <a:pPr marL="0" marR="0" lvl="0" indent="0" algn="l" defTabSz="914400" rtl="0" eaLnBrk="1" fontAlgn="auto" latinLnBrk="0" hangingPunct="1">
+              <a:lnSpc>
+                <a:spcPct val="100000"/>
+              </a:lnSpc>
+              <a:spcBef>
+                <a:spcPts val="0"/>
+              </a:spcBef>
+              <a:spcAft>
+                <a:spcPts val="0"/>
+              </a:spcAft>
+              <a:buClrTx/>
+              <a:buSzTx/>
+              <a:buFontTx/>
+              <a:buNone/>
+              <a:tabLst/>
+              <a:defRPr/>
+            </a:pPr>
+            <a:endParaRPr kumimoji="0" lang="fr-FR" sz="1200" b="0" i="0" u="none" strike="noStrike" kern="1200" cap="none" spc="0" normalizeH="0" baseline="0" noProof="0" dirty="0">
+              <a:ln>
+                <a:noFill/>
+              </a:ln>
+              <a:solidFill>
+                <a:prstClr val="black"/>
+              </a:solidFill>
+              <a:effectLst/>
+              <a:uLnTx/>
+              <a:uFillTx/>
+              <a:latin typeface="Calibri" panose="020F0502020204030204"/>
+              <a:ea typeface="+mn-ea"/>
+              <a:cs typeface="+mn-cs"/>
+            </a:endParaRPr>
+          </a:p>
+        </p:txBody>
+      </p:sp>
+      <p:sp>
+        <p:nvSpPr>
+          <p:cNvPr id="2" name="Titre 1">
+            <a:extLst>
+              <a:ext uri="{FF2B5EF4-FFF2-40B4-BE49-F238E27FC236}">
+                <a16:creationId xmlns:a16="http://schemas.microsoft.com/office/drawing/2014/main" id="{8D0BE7B8-BD59-A209-C860-906E75523200}"/>
+              </a:ext>
+            </a:extLst>
+          </p:cNvPr>
+          <p:cNvSpPr>
+            <a:spLocks noGrp="1"/>
+          </p:cNvSpPr>
+          <p:nvPr>
+            <p:ph type="title"/>
+          </p:nvPr>
+        </p:nvSpPr>
+        <p:spPr>
+          <a:xfrm>
+            <a:off x="838200" y="294789"/>
+            <a:ext cx="10515600" cy="1325563"/>
+          </a:xfrm>
+          <a:ln w="19050">
+            <a:solidFill>
+              <a:srgbClr val="00B0F0"/>
+            </a:solidFill>
+          </a:ln>
+        </p:spPr>
+        <p:txBody>
+          <a:bodyPr vert="horz" lIns="91440" tIns="45720" rIns="91440" bIns="45720" rtlCol="0" anchor="ctr">
+            <a:normAutofit/>
+          </a:bodyPr>
+          <a:lstStyle/>
+          <a:p>
+            <a:r>
+              <a:rPr lang="fr-FR" sz="3200" b="1" dirty="0" err="1"/>
+              <a:t>Clinical</a:t>
+            </a:r>
+            <a:r>
+              <a:rPr lang="fr-FR" sz="3200" b="1" dirty="0"/>
+              <a:t> Trial Management</a:t>
+            </a:r>
+            <a:br>
+              <a:rPr lang="fr-FR" sz="3200" b="1" dirty="0"/>
+            </a:br>
+            <a:r>
+              <a:rPr lang="fr-FR" sz="3200" dirty="0" err="1"/>
+              <a:t>Used</a:t>
+            </a:r>
+            <a:r>
+              <a:rPr lang="fr-FR" sz="3200" dirty="0"/>
+              <a:t> technologies</a:t>
+            </a:r>
+          </a:p>
+        </p:txBody>
+      </p:sp>
+      <p:pic>
+        <p:nvPicPr>
+          <p:cNvPr id="4" name="Image 3">
+            <a:extLst>
+              <a:ext uri="{FF2B5EF4-FFF2-40B4-BE49-F238E27FC236}">
+                <a16:creationId xmlns:a16="http://schemas.microsoft.com/office/drawing/2014/main" id="{33DB2155-674E-2A0A-D517-B2BA87B85916}"/>
+              </a:ext>
+            </a:extLst>
+          </p:cNvPr>
+          <p:cNvPicPr>
+            <a:picLocks noChangeAspect="1"/>
+          </p:cNvPicPr>
+          <p:nvPr/>
+        </p:nvPicPr>
+        <p:blipFill>
+          <a:blip r:embed="rId2">
+            <a:extLst>
+              <a:ext uri="{28A0092B-C50C-407E-A947-70E740481C1C}">
+                <a14:useLocalDpi xmlns:a14="http://schemas.microsoft.com/office/drawing/2010/main" val="0"/>
+              </a:ext>
+            </a:extLst>
+          </a:blip>
+          <a:stretch>
+            <a:fillRect/>
+          </a:stretch>
+        </p:blipFill>
+        <p:spPr>
+          <a:xfrm>
+            <a:off x="9973977" y="360569"/>
+            <a:ext cx="1202754" cy="1202754"/>
+          </a:xfrm>
+          <a:prstGeom prst="rect">
+            <a:avLst/>
+          </a:prstGeom>
+        </p:spPr>
+      </p:pic>
+      <p:sp>
+        <p:nvSpPr>
+          <p:cNvPr id="11" name="Rectangle : coins arrondis 10">
+            <a:extLst>
+              <a:ext uri="{FF2B5EF4-FFF2-40B4-BE49-F238E27FC236}">
+                <a16:creationId xmlns:a16="http://schemas.microsoft.com/office/drawing/2014/main" id="{37ABC495-7297-14EE-3CA8-86736E583504}"/>
+              </a:ext>
+            </a:extLst>
+          </p:cNvPr>
+          <p:cNvSpPr/>
+          <p:nvPr/>
+        </p:nvSpPr>
+        <p:spPr>
+          <a:xfrm>
+            <a:off x="3400870" y="2718344"/>
+            <a:ext cx="2392907" cy="694456"/>
+          </a:xfrm>
+          <a:prstGeom prst="roundRect">
+            <a:avLst/>
+          </a:prstGeom>
+          <a:solidFill>
+            <a:schemeClr val="bg1">
+              <a:lumMod val="85000"/>
+            </a:schemeClr>
+          </a:solidFill>
+        </p:spPr>
+        <p:style>
+          <a:lnRef idx="2">
+            <a:schemeClr val="accent1">
+              <a:shade val="50000"/>
+            </a:schemeClr>
+          </a:lnRef>
+          <a:fillRef idx="1">
+            <a:schemeClr val="accent1"/>
+          </a:fillRef>
+          <a:effectRef idx="0">
+            <a:schemeClr val="accent1"/>
+          </a:effectRef>
+          <a:fontRef idx="minor">
+            <a:schemeClr val="lt1"/>
+          </a:fontRef>
+        </p:style>
+        <p:txBody>
+          <a:bodyPr rtlCol="0" anchor="ctr"/>
+          <a:lstStyle/>
+          <a:p>
+            <a:pPr algn="ctr"/>
+            <a:r>
+              <a:rPr lang="fr-FR" sz="1800" b="1" dirty="0">
+                <a:solidFill>
+                  <a:srgbClr val="C00000"/>
+                </a:solidFill>
+              </a:rPr>
+              <a:t>Front</a:t>
+            </a:r>
+          </a:p>
+        </p:txBody>
+      </p:sp>
+      <p:sp>
+        <p:nvSpPr>
+          <p:cNvPr id="14" name="Rectangle : coins arrondis 13">
+            <a:extLst>
+              <a:ext uri="{FF2B5EF4-FFF2-40B4-BE49-F238E27FC236}">
+                <a16:creationId xmlns:a16="http://schemas.microsoft.com/office/drawing/2014/main" id="{467A2ACE-A040-0846-E446-46EE94C0B145}"/>
+              </a:ext>
+            </a:extLst>
+          </p:cNvPr>
+          <p:cNvSpPr/>
+          <p:nvPr/>
+        </p:nvSpPr>
+        <p:spPr>
+          <a:xfrm>
+            <a:off x="8818870" y="2791972"/>
+            <a:ext cx="2392907" cy="694456"/>
+          </a:xfrm>
+          <a:prstGeom prst="roundRect">
+            <a:avLst/>
+          </a:prstGeom>
+          <a:solidFill>
+            <a:schemeClr val="bg1">
+              <a:lumMod val="85000"/>
+            </a:schemeClr>
+          </a:solidFill>
+        </p:spPr>
+        <p:style>
+          <a:lnRef idx="2">
+            <a:schemeClr val="accent1">
+              <a:shade val="50000"/>
+            </a:schemeClr>
+          </a:lnRef>
+          <a:fillRef idx="1">
+            <a:schemeClr val="accent1"/>
+          </a:fillRef>
+          <a:effectRef idx="0">
+            <a:schemeClr val="accent1"/>
+          </a:effectRef>
+          <a:fontRef idx="minor">
+            <a:schemeClr val="lt1"/>
+          </a:fontRef>
+        </p:style>
+        <p:txBody>
+          <a:bodyPr rtlCol="0" anchor="ctr"/>
+          <a:lstStyle/>
+          <a:p>
+            <a:pPr algn="ctr"/>
+            <a:r>
+              <a:rPr lang="fr-FR" b="1" dirty="0">
+                <a:solidFill>
+                  <a:srgbClr val="C00000"/>
+                </a:solidFill>
+              </a:rPr>
+              <a:t>Back</a:t>
+            </a:r>
+            <a:endParaRPr lang="fr-FR" sz="1800" b="1" dirty="0">
+              <a:solidFill>
+                <a:srgbClr val="C00000"/>
+              </a:solidFill>
+            </a:endParaRPr>
+          </a:p>
+        </p:txBody>
+      </p:sp>
+      <p:sp>
+        <p:nvSpPr>
+          <p:cNvPr id="40" name="ZoneTexte 39">
+            <a:extLst>
+              <a:ext uri="{FF2B5EF4-FFF2-40B4-BE49-F238E27FC236}">
+                <a16:creationId xmlns:a16="http://schemas.microsoft.com/office/drawing/2014/main" id="{5908F535-F48B-3564-E44D-42D54A22B465}"/>
+              </a:ext>
+            </a:extLst>
+          </p:cNvPr>
+          <p:cNvSpPr txBox="1"/>
+          <p:nvPr/>
+        </p:nvSpPr>
+        <p:spPr>
+          <a:xfrm>
+            <a:off x="838200" y="2096077"/>
+            <a:ext cx="5097600" cy="1938992"/>
+          </a:xfrm>
+          <a:prstGeom prst="rect">
+            <a:avLst/>
+          </a:prstGeom>
+          <a:noFill/>
+          <a:ln w="12700">
+            <a:solidFill>
+              <a:srgbClr val="00B0F0"/>
+            </a:solidFill>
+          </a:ln>
+        </p:spPr>
+        <p:txBody>
+          <a:bodyPr wrap="square" rtlCol="0" anchor="ctr" anchorCtr="0">
+            <a:spAutoFit/>
+          </a:bodyPr>
+          <a:lstStyle/>
+          <a:p>
+            <a:pPr marL="0" marR="0" lvl="0" indent="0" algn="l" defTabSz="914400" rtl="0" eaLnBrk="1" fontAlgn="auto" latinLnBrk="0" hangingPunct="1">
+              <a:lnSpc>
+                <a:spcPct val="100000"/>
+              </a:lnSpc>
+              <a:spcBef>
+                <a:spcPts val="0"/>
+              </a:spcBef>
+              <a:spcAft>
+                <a:spcPts val="0"/>
+              </a:spcAft>
+              <a:buClrTx/>
+              <a:buSzTx/>
+              <a:buFontTx/>
+              <a:buNone/>
+              <a:tabLst/>
+              <a:defRPr/>
+            </a:pPr>
+            <a:endParaRPr kumimoji="0" lang="fr-FR" sz="1200" b="0" i="0" u="none" strike="noStrike" kern="1200" cap="none" spc="0" normalizeH="0" baseline="0" noProof="0" dirty="0">
+              <a:ln>
+                <a:noFill/>
+              </a:ln>
+              <a:solidFill>
+                <a:prstClr val="black"/>
+              </a:solidFill>
+              <a:effectLst/>
+              <a:uLnTx/>
+              <a:uFillTx/>
+              <a:latin typeface="Calibri" panose="020F0502020204030204"/>
+              <a:ea typeface="+mn-ea"/>
+              <a:cs typeface="+mn-cs"/>
+            </a:endParaRPr>
+          </a:p>
+          <a:p>
+            <a:pPr marL="0" marR="0" lvl="0" indent="0" algn="l" defTabSz="914400" rtl="0" eaLnBrk="1" fontAlgn="auto" latinLnBrk="0" hangingPunct="1">
+              <a:lnSpc>
+                <a:spcPct val="100000"/>
+              </a:lnSpc>
+              <a:spcBef>
+                <a:spcPts val="0"/>
+              </a:spcBef>
+              <a:spcAft>
+                <a:spcPts val="0"/>
+              </a:spcAft>
+              <a:buClrTx/>
+              <a:buSzTx/>
+              <a:buFontTx/>
+              <a:buNone/>
+              <a:tabLst/>
+              <a:defRPr/>
+            </a:pPr>
+            <a:r>
+              <a:rPr kumimoji="0" lang="fr-FR" sz="2400" b="0" i="0" u="none" strike="noStrike" kern="1200" cap="none" spc="0" normalizeH="0" baseline="0" noProof="0" dirty="0" err="1">
+                <a:ln>
+                  <a:noFill/>
+                </a:ln>
+                <a:solidFill>
+                  <a:prstClr val="black"/>
+                </a:solidFill>
+                <a:effectLst/>
+                <a:uLnTx/>
+                <a:uFillTx/>
+                <a:latin typeface="Calibri" panose="020F0502020204030204"/>
+                <a:ea typeface="+mn-ea"/>
+                <a:cs typeface="+mn-cs"/>
+              </a:rPr>
+              <a:t>React</a:t>
+            </a:r>
+            <a:endParaRPr kumimoji="0" lang="fr-FR" sz="2400" b="0" i="0" u="none" strike="noStrike" kern="1200" cap="none" spc="0" normalizeH="0" baseline="0" noProof="0" dirty="0">
+              <a:ln>
+                <a:noFill/>
+              </a:ln>
+              <a:solidFill>
+                <a:prstClr val="black"/>
+              </a:solidFill>
+              <a:effectLst/>
+              <a:uLnTx/>
+              <a:uFillTx/>
+              <a:latin typeface="Calibri" panose="020F0502020204030204"/>
+              <a:ea typeface="+mn-ea"/>
+              <a:cs typeface="+mn-cs"/>
+            </a:endParaRPr>
+          </a:p>
+          <a:p>
+            <a:pPr marL="0" marR="0" lvl="0" indent="0" algn="l" defTabSz="914400" rtl="0" eaLnBrk="1" fontAlgn="auto" latinLnBrk="0" hangingPunct="1">
+              <a:lnSpc>
+                <a:spcPct val="100000"/>
+              </a:lnSpc>
+              <a:spcBef>
+                <a:spcPts val="0"/>
+              </a:spcBef>
+              <a:spcAft>
+                <a:spcPts val="0"/>
+              </a:spcAft>
+              <a:buClrTx/>
+              <a:buSzTx/>
+              <a:buFontTx/>
+              <a:buNone/>
+              <a:tabLst/>
+              <a:defRPr/>
+            </a:pPr>
+            <a:r>
+              <a:rPr kumimoji="0" lang="fr-FR" sz="2400" b="0" i="0" u="none" strike="noStrike" kern="1200" cap="none" spc="0" normalizeH="0" baseline="0" noProof="0" dirty="0" err="1">
+                <a:ln>
+                  <a:noFill/>
+                </a:ln>
+                <a:solidFill>
+                  <a:prstClr val="black"/>
+                </a:solidFill>
+                <a:effectLst/>
+                <a:uLnTx/>
+                <a:uFillTx/>
+                <a:latin typeface="Calibri" panose="020F0502020204030204"/>
+                <a:ea typeface="+mn-ea"/>
+                <a:cs typeface="+mn-cs"/>
+              </a:rPr>
+              <a:t>React</a:t>
+            </a:r>
+            <a:r>
+              <a:rPr kumimoji="0" lang="fr-FR" sz="2400" b="0" i="0" u="none" strike="noStrike" kern="1200" cap="none" spc="0" normalizeH="0" baseline="0" noProof="0" dirty="0">
+                <a:ln>
+                  <a:noFill/>
+                </a:ln>
+                <a:solidFill>
+                  <a:prstClr val="black"/>
+                </a:solidFill>
+                <a:effectLst/>
+                <a:uLnTx/>
+                <a:uFillTx/>
+                <a:latin typeface="Calibri" panose="020F0502020204030204"/>
+                <a:ea typeface="+mn-ea"/>
+                <a:cs typeface="+mn-cs"/>
+              </a:rPr>
+              <a:t>-router dom</a:t>
+            </a:r>
+          </a:p>
+          <a:p>
+            <a:pPr marL="0" marR="0" lvl="0" indent="0" algn="l" defTabSz="914400" rtl="0" eaLnBrk="1" fontAlgn="auto" latinLnBrk="0" hangingPunct="1">
+              <a:lnSpc>
+                <a:spcPct val="100000"/>
+              </a:lnSpc>
+              <a:spcBef>
+                <a:spcPts val="0"/>
+              </a:spcBef>
+              <a:spcAft>
+                <a:spcPts val="0"/>
+              </a:spcAft>
+              <a:buClrTx/>
+              <a:buSzTx/>
+              <a:buFontTx/>
+              <a:buNone/>
+              <a:tabLst/>
+              <a:defRPr/>
+            </a:pPr>
+            <a:r>
+              <a:rPr lang="fr-FR" sz="2400" dirty="0" err="1">
+                <a:solidFill>
+                  <a:prstClr val="black"/>
+                </a:solidFill>
+                <a:latin typeface="Calibri" panose="020F0502020204030204"/>
+              </a:rPr>
+              <a:t>React-pdf</a:t>
+            </a:r>
+            <a:endParaRPr kumimoji="0" lang="fr-FR" sz="2400" b="0" i="0" u="none" strike="noStrike" kern="1200" cap="none" spc="0" normalizeH="0" baseline="0" noProof="0" dirty="0">
+              <a:ln>
+                <a:noFill/>
+              </a:ln>
+              <a:solidFill>
+                <a:prstClr val="black"/>
+              </a:solidFill>
+              <a:effectLst/>
+              <a:uLnTx/>
+              <a:uFillTx/>
+              <a:latin typeface="Calibri" panose="020F0502020204030204"/>
+              <a:ea typeface="+mn-ea"/>
+              <a:cs typeface="+mn-cs"/>
+            </a:endParaRPr>
+          </a:p>
+          <a:p>
+            <a:pPr marL="0" marR="0" lvl="0" indent="0" algn="l" defTabSz="914400" rtl="0" eaLnBrk="1" fontAlgn="auto" latinLnBrk="0" hangingPunct="1">
+              <a:lnSpc>
+                <a:spcPct val="100000"/>
+              </a:lnSpc>
+              <a:spcBef>
+                <a:spcPts val="0"/>
+              </a:spcBef>
+              <a:spcAft>
+                <a:spcPts val="0"/>
+              </a:spcAft>
+              <a:buClrTx/>
+              <a:buSzTx/>
+              <a:buFontTx/>
+              <a:buNone/>
+              <a:tabLst/>
+              <a:defRPr/>
+            </a:pPr>
+            <a:r>
+              <a:rPr kumimoji="0" lang="fr-FR" sz="2400" b="0" i="0" u="none" strike="noStrike" kern="1200" cap="none" spc="0" normalizeH="0" baseline="0" noProof="0" dirty="0">
+                <a:ln>
+                  <a:noFill/>
+                </a:ln>
+                <a:solidFill>
+                  <a:prstClr val="black"/>
+                </a:solidFill>
+                <a:effectLst/>
+                <a:uLnTx/>
+                <a:uFillTx/>
+                <a:latin typeface="Calibri" panose="020F0502020204030204"/>
+                <a:ea typeface="+mn-ea"/>
+                <a:cs typeface="+mn-cs"/>
+              </a:rPr>
+              <a:t>Bootstrap</a:t>
+            </a:r>
+          </a:p>
+          <a:p>
+            <a:pPr marL="0" marR="0" lvl="0" indent="0" algn="l" defTabSz="914400" rtl="0" eaLnBrk="1" fontAlgn="auto" latinLnBrk="0" hangingPunct="1">
+              <a:lnSpc>
+                <a:spcPct val="100000"/>
+              </a:lnSpc>
+              <a:spcBef>
+                <a:spcPts val="0"/>
+              </a:spcBef>
+              <a:spcAft>
+                <a:spcPts val="0"/>
+              </a:spcAft>
+              <a:buClrTx/>
+              <a:buSzTx/>
+              <a:buFontTx/>
+              <a:buNone/>
+              <a:tabLst/>
+              <a:defRPr/>
+            </a:pPr>
+            <a:endParaRPr kumimoji="0" lang="fr-FR" sz="1200" b="0" i="0" u="none" strike="noStrike" kern="1200" cap="none" spc="0" normalizeH="0" baseline="0" noProof="0" dirty="0">
+              <a:ln>
+                <a:noFill/>
+              </a:ln>
+              <a:solidFill>
+                <a:prstClr val="black"/>
+              </a:solidFill>
+              <a:effectLst/>
+              <a:uLnTx/>
+              <a:uFillTx/>
+              <a:latin typeface="Calibri" panose="020F0502020204030204"/>
+              <a:ea typeface="+mn-ea"/>
+              <a:cs typeface="+mn-cs"/>
+            </a:endParaRPr>
+          </a:p>
+        </p:txBody>
+      </p:sp>
+      <p:sp>
+        <p:nvSpPr>
+          <p:cNvPr id="41" name="ZoneTexte 40">
+            <a:extLst>
+              <a:ext uri="{FF2B5EF4-FFF2-40B4-BE49-F238E27FC236}">
+                <a16:creationId xmlns:a16="http://schemas.microsoft.com/office/drawing/2014/main" id="{4DD0BAD4-B8FA-6ED0-27C1-E161D07E925F}"/>
+              </a:ext>
+            </a:extLst>
+          </p:cNvPr>
+          <p:cNvSpPr txBox="1"/>
+          <p:nvPr/>
+        </p:nvSpPr>
+        <p:spPr>
+          <a:xfrm>
+            <a:off x="6256200" y="1985038"/>
+            <a:ext cx="5097600" cy="2308324"/>
+          </a:xfrm>
+          <a:prstGeom prst="rect">
+            <a:avLst/>
+          </a:prstGeom>
+          <a:noFill/>
+          <a:ln w="12700">
+            <a:solidFill>
+              <a:srgbClr val="00B0F0"/>
+            </a:solidFill>
+          </a:ln>
+        </p:spPr>
+        <p:txBody>
+          <a:bodyPr wrap="square" rtlCol="0" anchor="ctr" anchorCtr="0">
+            <a:spAutoFit/>
+          </a:bodyPr>
+          <a:lstStyle/>
+          <a:p>
+            <a:endParaRPr lang="fr-FR" sz="1200" dirty="0"/>
+          </a:p>
+          <a:p>
+            <a:r>
+              <a:rPr lang="fr-FR" sz="2400" dirty="0"/>
+              <a:t>Express</a:t>
+            </a:r>
+          </a:p>
+          <a:p>
+            <a:r>
+              <a:rPr lang="fr-FR" sz="2400" dirty="0" err="1"/>
+              <a:t>Dotenv</a:t>
+            </a:r>
+            <a:endParaRPr lang="fr-FR" sz="2400" dirty="0"/>
+          </a:p>
+          <a:p>
+            <a:r>
+              <a:rPr lang="fr-FR" sz="2400" dirty="0" err="1"/>
+              <a:t>JwT</a:t>
+            </a:r>
+            <a:endParaRPr lang="fr-FR" sz="2400" dirty="0"/>
+          </a:p>
+          <a:p>
+            <a:r>
+              <a:rPr lang="fr-FR" sz="2400" dirty="0"/>
+              <a:t>MySQL 12</a:t>
+            </a:r>
+          </a:p>
+          <a:p>
+            <a:r>
+              <a:rPr lang="fr-FR" sz="2400" dirty="0" err="1"/>
+              <a:t>nodemon</a:t>
+            </a:r>
+            <a:r>
+              <a:rPr lang="fr-FR" sz="2400" dirty="0"/>
+              <a:t> for dev</a:t>
+            </a:r>
+          </a:p>
+          <a:p>
+            <a:endParaRPr lang="fr-FR" sz="1200" dirty="0"/>
+          </a:p>
+        </p:txBody>
+      </p:sp>
+      <p:sp>
+        <p:nvSpPr>
+          <p:cNvPr id="42" name="Rectangle : coins arrondis 41">
+            <a:extLst>
+              <a:ext uri="{FF2B5EF4-FFF2-40B4-BE49-F238E27FC236}">
+                <a16:creationId xmlns:a16="http://schemas.microsoft.com/office/drawing/2014/main" id="{FCC6973D-2A61-0D4C-B9A0-999B56CCD4D0}"/>
+              </a:ext>
+            </a:extLst>
+          </p:cNvPr>
+          <p:cNvSpPr/>
+          <p:nvPr/>
+        </p:nvSpPr>
+        <p:spPr>
+          <a:xfrm>
+            <a:off x="6138070" y="4983899"/>
+            <a:ext cx="2392907" cy="694456"/>
+          </a:xfrm>
+          <a:prstGeom prst="roundRect">
+            <a:avLst/>
+          </a:prstGeom>
+          <a:solidFill>
+            <a:schemeClr val="bg1">
+              <a:lumMod val="85000"/>
+            </a:schemeClr>
+          </a:solidFill>
+        </p:spPr>
+        <p:style>
+          <a:lnRef idx="2">
+            <a:schemeClr val="accent1">
+              <a:shade val="50000"/>
+            </a:schemeClr>
+          </a:lnRef>
+          <a:fillRef idx="1">
+            <a:schemeClr val="accent1"/>
+          </a:fillRef>
+          <a:effectRef idx="0">
+            <a:schemeClr val="accent1"/>
+          </a:effectRef>
+          <a:fontRef idx="minor">
+            <a:schemeClr val="lt1"/>
+          </a:fontRef>
+        </p:style>
+        <p:txBody>
+          <a:bodyPr rtlCol="0" anchor="ctr"/>
+          <a:lstStyle/>
+          <a:p>
+            <a:pPr algn="ctr"/>
+            <a:r>
+              <a:rPr lang="fr-FR" sz="1800" b="1" dirty="0" err="1">
+                <a:solidFill>
+                  <a:srgbClr val="C00000"/>
+                </a:solidFill>
+              </a:rPr>
+              <a:t>Database</a:t>
+            </a:r>
+            <a:endParaRPr lang="fr-FR" sz="1800" b="1" dirty="0">
+              <a:solidFill>
+                <a:srgbClr val="C00000"/>
+              </a:solidFill>
+            </a:endParaRPr>
+          </a:p>
+        </p:txBody>
+      </p:sp>
+    </p:spTree>
+    <p:extLst>
+      <p:ext uri="{BB962C8B-B14F-4D97-AF65-F5344CB8AC3E}">
+        <p14:creationId xmlns:p14="http://schemas.microsoft.com/office/powerpoint/2010/main" val="1243136172"/>
+      </p:ext>
+    </p:extLst>
+  </p:cSld>
+  <p:clrMapOvr>
+    <a:masterClrMapping/>
+  </p:clrMapOvr>
+</p:sld>
+</file>
+
+<file path=ppt/slides/slide5.xml><?xml version="1.0" encoding="utf-8"?>
+<p:sld xmlns:a="http://schemas.openxmlformats.org/drawingml/2006/main" xmlns:r="http://schemas.openxmlformats.org/officeDocument/2006/relationships" xmlns:p="http://schemas.openxmlformats.org/presentationml/2006/main">
+  <p:cSld>
+    <p:spTree>
+      <p:nvGrpSpPr>
+        <p:cNvPr id="1" name=""/>
+        <p:cNvGrpSpPr/>
+        <p:nvPr/>
+      </p:nvGrpSpPr>
+      <p:grpSpPr>
+        <a:xfrm>
+          <a:off x="0" y="0"/>
+          <a:ext cx="0" cy="0"/>
+          <a:chOff x="0" y="0"/>
+          <a:chExt cx="0" cy="0"/>
+        </a:xfrm>
+      </p:grpSpPr>
+      <p:sp>
+        <p:nvSpPr>
+          <p:cNvPr id="2" name="Titre 1">
+            <a:extLst>
+              <a:ext uri="{FF2B5EF4-FFF2-40B4-BE49-F238E27FC236}">
+                <a16:creationId xmlns:a16="http://schemas.microsoft.com/office/drawing/2014/main" id="{8D0BE7B8-BD59-A209-C860-906E75523200}"/>
+              </a:ext>
+            </a:extLst>
+          </p:cNvPr>
+          <p:cNvSpPr>
+            <a:spLocks noGrp="1"/>
+          </p:cNvSpPr>
+          <p:nvPr>
+            <p:ph type="title"/>
+          </p:nvPr>
+        </p:nvSpPr>
+        <p:spPr>
+          <a:xfrm>
+            <a:off x="838200" y="294789"/>
+            <a:ext cx="10515600" cy="1325563"/>
+          </a:xfrm>
+          <a:ln w="19050">
+            <a:solidFill>
+              <a:srgbClr val="00B0F0"/>
+            </a:solidFill>
+          </a:ln>
+        </p:spPr>
+        <p:txBody>
+          <a:bodyPr vert="horz" lIns="91440" tIns="45720" rIns="91440" bIns="45720" rtlCol="0" anchor="ctr">
+            <a:normAutofit/>
+          </a:bodyPr>
+          <a:lstStyle/>
+          <a:p>
+            <a:pPr marL="0" indent="0">
+              <a:buNone/>
+            </a:pPr>
+            <a:r>
+              <a:rPr lang="fr-FR" sz="3200" b="1" dirty="0" err="1"/>
+              <a:t>Clinical</a:t>
+            </a:r>
+            <a:r>
+              <a:rPr lang="fr-FR" sz="3200" b="1" dirty="0"/>
+              <a:t> Trial Management</a:t>
+            </a:r>
+            <a:br>
+              <a:rPr lang="fr-FR" sz="3200" b="1" dirty="0"/>
+            </a:br>
+            <a:r>
+              <a:rPr lang="fr-FR" sz="2400" b="1" dirty="0" err="1"/>
+              <a:t>Quality</a:t>
+            </a:r>
+            <a:r>
+              <a:rPr lang="fr-FR" sz="2400" b="1" dirty="0"/>
+              <a:t> and Security compliance</a:t>
+            </a:r>
+          </a:p>
+        </p:txBody>
+      </p:sp>
+      <p:pic>
+        <p:nvPicPr>
+          <p:cNvPr id="4" name="Image 3">
+            <a:extLst>
+              <a:ext uri="{FF2B5EF4-FFF2-40B4-BE49-F238E27FC236}">
+                <a16:creationId xmlns:a16="http://schemas.microsoft.com/office/drawing/2014/main" id="{33DB2155-674E-2A0A-D517-B2BA87B85916}"/>
+              </a:ext>
+            </a:extLst>
+          </p:cNvPr>
+          <p:cNvPicPr>
+            <a:picLocks noChangeAspect="1"/>
+          </p:cNvPicPr>
+          <p:nvPr/>
+        </p:nvPicPr>
+        <p:blipFill>
+          <a:blip r:embed="rId2">
+            <a:extLst>
+              <a:ext uri="{28A0092B-C50C-407E-A947-70E740481C1C}">
+                <a14:useLocalDpi xmlns:a14="http://schemas.microsoft.com/office/drawing/2010/main" val="0"/>
+              </a:ext>
+            </a:extLst>
+          </a:blip>
+          <a:stretch>
+            <a:fillRect/>
+          </a:stretch>
+        </p:blipFill>
+        <p:spPr>
+          <a:xfrm>
+            <a:off x="9973977" y="360569"/>
+            <a:ext cx="1202754" cy="1202754"/>
+          </a:xfrm>
+          <a:prstGeom prst="rect">
+            <a:avLst/>
+          </a:prstGeom>
+        </p:spPr>
+      </p:pic>
+      <p:sp>
+        <p:nvSpPr>
+          <p:cNvPr id="6" name="ZoneTexte 5">
+            <a:extLst>
+              <a:ext uri="{FF2B5EF4-FFF2-40B4-BE49-F238E27FC236}">
+                <a16:creationId xmlns:a16="http://schemas.microsoft.com/office/drawing/2014/main" id="{1378270D-820A-504F-3AE7-5B9C0BEB9A65}"/>
+              </a:ext>
+            </a:extLst>
+          </p:cNvPr>
+          <p:cNvSpPr txBox="1"/>
+          <p:nvPr/>
+        </p:nvSpPr>
+        <p:spPr>
+          <a:xfrm>
+            <a:off x="6775666" y="2842430"/>
+            <a:ext cx="4509650" cy="3416320"/>
+          </a:xfrm>
+          <a:prstGeom prst="rect">
+            <a:avLst/>
+          </a:prstGeom>
+          <a:noFill/>
+        </p:spPr>
+        <p:txBody>
+          <a:bodyPr wrap="square" rtlCol="0">
+            <a:spAutoFit/>
+          </a:bodyPr>
+          <a:lstStyle/>
+          <a:p>
+            <a:pPr marL="285750" indent="-285750">
+              <a:buFont typeface="Arial" panose="020B0604020202020204" pitchFamily="34" charset="0"/>
+              <a:buChar char="•"/>
+            </a:pPr>
+            <a:r>
+              <a:rPr lang="fr-FR" dirty="0" err="1"/>
+              <a:t>Users</a:t>
+            </a:r>
+            <a:r>
+              <a:rPr lang="fr-FR" dirty="0"/>
+              <a:t> must have an </a:t>
+            </a:r>
+            <a:r>
+              <a:rPr lang="fr-FR" dirty="0" err="1"/>
+              <a:t>account</a:t>
+            </a:r>
+            <a:r>
+              <a:rPr lang="fr-FR" dirty="0"/>
+              <a:t> </a:t>
+            </a:r>
+            <a:r>
+              <a:rPr lang="fr-FR" dirty="0" err="1"/>
+              <a:t>recorded</a:t>
+            </a:r>
+            <a:r>
+              <a:rPr lang="fr-FR" dirty="0"/>
+              <a:t> in the </a:t>
+            </a:r>
+            <a:r>
+              <a:rPr lang="fr-FR" dirty="0" err="1"/>
+              <a:t>database</a:t>
+            </a:r>
+            <a:endParaRPr lang="fr-FR" dirty="0"/>
+          </a:p>
+          <a:p>
+            <a:pPr marL="285750" indent="-285750">
+              <a:buFont typeface="Arial" panose="020B0604020202020204" pitchFamily="34" charset="0"/>
+              <a:buChar char="•"/>
+            </a:pPr>
+            <a:endParaRPr lang="fr-FR" dirty="0"/>
+          </a:p>
+          <a:p>
+            <a:pPr marL="285750" indent="-285750">
+              <a:buFont typeface="Arial" panose="020B0604020202020204" pitchFamily="34" charset="0"/>
+              <a:buChar char="•"/>
+            </a:pPr>
+            <a:r>
+              <a:rPr lang="fr-FR" dirty="0"/>
+              <a:t>If the user </a:t>
+            </a:r>
+            <a:r>
+              <a:rPr lang="fr-FR" dirty="0" err="1"/>
+              <a:t>is</a:t>
+            </a:r>
+            <a:r>
+              <a:rPr lang="fr-FR" dirty="0"/>
+              <a:t> </a:t>
+            </a:r>
+            <a:r>
+              <a:rPr lang="fr-FR" dirty="0" err="1"/>
+              <a:t>recognized</a:t>
+            </a:r>
+            <a:r>
+              <a:rPr lang="fr-FR" dirty="0"/>
+              <a:t>, the backend </a:t>
+            </a:r>
+            <a:r>
+              <a:rPr lang="fr-FR" dirty="0" err="1"/>
+              <a:t>sends</a:t>
+            </a:r>
+            <a:r>
+              <a:rPr lang="fr-FR" dirty="0"/>
+              <a:t> a </a:t>
+            </a:r>
+            <a:r>
+              <a:rPr lang="fr-FR" dirty="0" err="1"/>
+              <a:t>security</a:t>
+            </a:r>
+            <a:r>
+              <a:rPr lang="fr-FR" dirty="0"/>
+              <a:t> </a:t>
+            </a:r>
+            <a:r>
+              <a:rPr lang="fr-FR" dirty="0" err="1"/>
+              <a:t>token</a:t>
+            </a:r>
+            <a:endParaRPr lang="fr-FR" dirty="0"/>
+          </a:p>
+          <a:p>
+            <a:pPr marL="285750" indent="-285750">
+              <a:buFont typeface="Arial" panose="020B0604020202020204" pitchFamily="34" charset="0"/>
+              <a:buChar char="•"/>
+            </a:pPr>
+            <a:endParaRPr lang="fr-FR" dirty="0"/>
+          </a:p>
+          <a:p>
+            <a:pPr marL="285750" indent="-285750">
+              <a:buFont typeface="Arial" panose="020B0604020202020204" pitchFamily="34" charset="0"/>
+              <a:buChar char="•"/>
+            </a:pPr>
+            <a:r>
+              <a:rPr lang="fr-FR" dirty="0"/>
+              <a:t>The </a:t>
+            </a:r>
+            <a:r>
+              <a:rPr lang="fr-FR" dirty="0" err="1"/>
+              <a:t>user’s</a:t>
+            </a:r>
+            <a:r>
+              <a:rPr lang="fr-FR" dirty="0"/>
+              <a:t> rôle </a:t>
+            </a:r>
+            <a:r>
+              <a:rPr lang="fr-FR" dirty="0" err="1"/>
+              <a:t>is</a:t>
+            </a:r>
+            <a:r>
+              <a:rPr lang="fr-FR" dirty="0"/>
+              <a:t> </a:t>
+            </a:r>
+            <a:r>
+              <a:rPr lang="fr-FR" dirty="0" err="1"/>
+              <a:t>provided</a:t>
+            </a:r>
+            <a:r>
+              <a:rPr lang="fr-FR" dirty="0"/>
+              <a:t> by the </a:t>
+            </a:r>
+            <a:r>
+              <a:rPr lang="fr-FR" dirty="0" err="1"/>
+              <a:t>db</a:t>
+            </a:r>
+            <a:endParaRPr lang="fr-FR" dirty="0"/>
+          </a:p>
+          <a:p>
+            <a:pPr marL="742950" lvl="1" indent="-285750">
+              <a:buFont typeface="Arial" panose="020B0604020202020204" pitchFamily="34" charset="0"/>
+              <a:buChar char="•"/>
+            </a:pPr>
+            <a:r>
+              <a:rPr lang="fr-FR" dirty="0"/>
+              <a:t>Modification </a:t>
+            </a:r>
+            <a:r>
+              <a:rPr lang="fr-FR" dirty="0" err="1"/>
+              <a:t>features</a:t>
+            </a:r>
+            <a:r>
+              <a:rPr lang="fr-FR" dirty="0"/>
+              <a:t> are visible </a:t>
+            </a:r>
+            <a:r>
+              <a:rPr lang="fr-FR" dirty="0" err="1"/>
+              <a:t>depending</a:t>
+            </a:r>
+            <a:r>
+              <a:rPr lang="fr-FR" dirty="0"/>
+              <a:t> of the rôle</a:t>
+            </a:r>
+          </a:p>
+          <a:p>
+            <a:pPr marL="742950" lvl="1" indent="-285750">
+              <a:buFont typeface="Arial" panose="020B0604020202020204" pitchFamily="34" charset="0"/>
+              <a:buChar char="•"/>
+            </a:pPr>
+            <a:r>
+              <a:rPr lang="fr-FR" dirty="0"/>
+              <a:t>Information in pages are in </a:t>
+            </a:r>
+            <a:r>
+              <a:rPr lang="fr-FR" dirty="0" err="1"/>
+              <a:t>view</a:t>
+            </a:r>
+            <a:r>
+              <a:rPr lang="fr-FR" dirty="0"/>
+              <a:t> mode </a:t>
+            </a:r>
+            <a:r>
+              <a:rPr lang="fr-FR" dirty="0" err="1"/>
+              <a:t>only</a:t>
+            </a:r>
+            <a:endParaRPr lang="fr-FR" dirty="0"/>
+          </a:p>
+          <a:p>
+            <a:pPr marL="285750" indent="-285750">
+              <a:buFont typeface="Arial" panose="020B0604020202020204" pitchFamily="34" charset="0"/>
+              <a:buChar char="•"/>
+            </a:pPr>
+            <a:endParaRPr lang="fr-FR" dirty="0"/>
+          </a:p>
+        </p:txBody>
+      </p:sp>
+      <p:pic>
+        <p:nvPicPr>
+          <p:cNvPr id="8" name="Image 7">
+            <a:extLst>
+              <a:ext uri="{FF2B5EF4-FFF2-40B4-BE49-F238E27FC236}">
+                <a16:creationId xmlns:a16="http://schemas.microsoft.com/office/drawing/2014/main" id="{2AA1ACD7-8C91-276A-DFCF-381E91A283E2}"/>
+              </a:ext>
+            </a:extLst>
+          </p:cNvPr>
+          <p:cNvPicPr>
+            <a:picLocks noChangeAspect="1"/>
+          </p:cNvPicPr>
+          <p:nvPr/>
+        </p:nvPicPr>
+        <p:blipFill>
+          <a:blip r:embed="rId3"/>
+          <a:stretch>
+            <a:fillRect/>
+          </a:stretch>
+        </p:blipFill>
+        <p:spPr>
+          <a:xfrm>
+            <a:off x="1128878" y="2787165"/>
+            <a:ext cx="4762533" cy="3573371"/>
+          </a:xfrm>
+          <a:prstGeom prst="rect">
+            <a:avLst/>
+          </a:prstGeom>
+          <a:ln>
+            <a:noFill/>
+          </a:ln>
+          <a:effectLst>
+            <a:outerShdw blurRad="292100" dist="139700" dir="2700000" algn="tl" rotWithShape="0">
+              <a:srgbClr val="333333">
+                <a:alpha val="65000"/>
+              </a:srgbClr>
+            </a:outerShdw>
+          </a:effectLst>
+        </p:spPr>
+      </p:pic>
+      <p:sp>
+        <p:nvSpPr>
+          <p:cNvPr id="10" name="ZoneTexte 9">
+            <a:extLst>
+              <a:ext uri="{FF2B5EF4-FFF2-40B4-BE49-F238E27FC236}">
+                <a16:creationId xmlns:a16="http://schemas.microsoft.com/office/drawing/2014/main" id="{E83C48C3-0D37-9AE1-674B-977E4F067DF7}"/>
+              </a:ext>
+            </a:extLst>
+          </p:cNvPr>
+          <p:cNvSpPr txBox="1"/>
+          <p:nvPr/>
+        </p:nvSpPr>
+        <p:spPr>
+          <a:xfrm>
+            <a:off x="461726" y="1760628"/>
+            <a:ext cx="5756194" cy="830997"/>
+          </a:xfrm>
+          <a:prstGeom prst="rect">
+            <a:avLst/>
+          </a:prstGeom>
+          <a:noFill/>
+        </p:spPr>
+        <p:txBody>
+          <a:bodyPr wrap="square">
+            <a:spAutoFit/>
+          </a:bodyPr>
+          <a:lstStyle/>
+          <a:p>
+            <a:r>
+              <a:rPr kumimoji="0" lang="fr-FR" sz="1600" b="0" i="0" u="none" strike="noStrike" kern="1200" cap="none" spc="0" normalizeH="0" baseline="0" noProof="0" dirty="0">
+                <a:ln>
+                  <a:noFill/>
+                </a:ln>
+                <a:solidFill>
+                  <a:prstClr val="black"/>
+                </a:solidFill>
+                <a:effectLst/>
+                <a:uLnTx/>
+                <a:uFillTx/>
+                <a:latin typeface="Calibri" panose="020F0502020204030204"/>
+                <a:ea typeface="+mn-ea"/>
+                <a:cs typeface="+mn-cs"/>
+              </a:rPr>
+              <a:t>« </a:t>
+            </a:r>
+            <a:r>
+              <a:rPr kumimoji="0" lang="fr-FR" sz="1600" b="0" i="0" u="none" strike="noStrike" kern="1200" cap="none" spc="0" normalizeH="0" baseline="0" noProof="0" dirty="0">
+                <a:ln>
+                  <a:noFill/>
+                </a:ln>
+                <a:solidFill>
+                  <a:srgbClr val="00B0F0"/>
+                </a:solidFill>
+                <a:effectLst/>
+                <a:uLnTx/>
+                <a:uFillTx/>
+                <a:latin typeface="Calibri" panose="020F0502020204030204"/>
+                <a:ea typeface="+mn-ea"/>
+                <a:cs typeface="+mn-cs"/>
+              </a:rPr>
+              <a:t>As an IT Security Manager, </a:t>
+            </a:r>
+            <a:r>
+              <a:rPr kumimoji="0" lang="fr-FR" sz="1600" b="0" i="0" u="none" strike="noStrike" kern="1200" cap="none" spc="0" normalizeH="0" baseline="0" noProof="0" dirty="0">
+                <a:ln>
+                  <a:noFill/>
+                </a:ln>
+                <a:solidFill>
+                  <a:prstClr val="black"/>
+                </a:solidFill>
+                <a:effectLst/>
+                <a:uLnTx/>
+                <a:uFillTx/>
+                <a:latin typeface="Calibri" panose="020F0502020204030204"/>
+                <a:ea typeface="+mn-ea"/>
+                <a:cs typeface="+mn-cs"/>
+              </a:rPr>
+              <a:t>I </a:t>
+            </a:r>
+            <a:r>
+              <a:rPr kumimoji="0" lang="fr-FR" sz="1600" b="0" i="0" u="none" strike="noStrike" kern="1200" cap="none" spc="0" normalizeH="0" baseline="0" noProof="0" dirty="0" err="1">
+                <a:ln>
+                  <a:noFill/>
+                </a:ln>
+                <a:solidFill>
+                  <a:prstClr val="black"/>
+                </a:solidFill>
+                <a:effectLst/>
+                <a:uLnTx/>
+                <a:uFillTx/>
+                <a:latin typeface="Calibri" panose="020F0502020204030204"/>
+                <a:ea typeface="+mn-ea"/>
+                <a:cs typeface="+mn-cs"/>
+              </a:rPr>
+              <a:t>need</a:t>
+            </a:r>
+            <a:r>
+              <a:rPr kumimoji="0" lang="fr-FR" sz="1600" b="0" i="0" u="none" strike="noStrike" kern="1200" cap="none" spc="0" normalizeH="0" baseline="0" noProof="0" dirty="0">
+                <a:ln>
+                  <a:noFill/>
+                </a:ln>
+                <a:solidFill>
+                  <a:prstClr val="black"/>
+                </a:solidFill>
+                <a:effectLst/>
+                <a:uLnTx/>
+                <a:uFillTx/>
+                <a:latin typeface="Calibri" panose="020F0502020204030204"/>
+                <a:ea typeface="+mn-ea"/>
+                <a:cs typeface="+mn-cs"/>
+              </a:rPr>
+              <a:t> </a:t>
+            </a:r>
+            <a:r>
+              <a:rPr kumimoji="0" lang="fr-FR" sz="1600" b="0" i="0" u="none" strike="noStrike" kern="1200" cap="none" spc="0" normalizeH="0" baseline="0" noProof="0" dirty="0" err="1">
+                <a:ln>
+                  <a:noFill/>
+                </a:ln>
+                <a:solidFill>
+                  <a:prstClr val="black"/>
+                </a:solidFill>
+                <a:effectLst/>
+                <a:uLnTx/>
+                <a:uFillTx/>
+                <a:latin typeface="Calibri" panose="020F0502020204030204"/>
+                <a:ea typeface="+mn-ea"/>
+                <a:cs typeface="+mn-cs"/>
+              </a:rPr>
+              <a:t>users</a:t>
+            </a:r>
+            <a:r>
+              <a:rPr kumimoji="0" lang="fr-FR" sz="1600" b="0" i="0" u="none" strike="noStrike" kern="1200" cap="none" spc="0" normalizeH="0" baseline="0" noProof="0" dirty="0">
+                <a:ln>
+                  <a:noFill/>
+                </a:ln>
+                <a:solidFill>
+                  <a:prstClr val="black"/>
+                </a:solidFill>
+                <a:effectLst/>
+                <a:uLnTx/>
+                <a:uFillTx/>
+                <a:latin typeface="Calibri" panose="020F0502020204030204"/>
+                <a:ea typeface="+mn-ea"/>
+                <a:cs typeface="+mn-cs"/>
+              </a:rPr>
+              <a:t> to </a:t>
+            </a:r>
+            <a:r>
+              <a:rPr kumimoji="0" lang="fr-FR" sz="1600" b="0" i="0" u="none" strike="noStrike" kern="1200" cap="none" spc="0" normalizeH="0" baseline="0" noProof="0" dirty="0" err="1">
+                <a:ln>
+                  <a:noFill/>
+                </a:ln>
+                <a:solidFill>
+                  <a:prstClr val="black"/>
+                </a:solidFill>
+                <a:effectLst/>
+                <a:uLnTx/>
+                <a:uFillTx/>
+                <a:latin typeface="Calibri" panose="020F0502020204030204"/>
+                <a:ea typeface="+mn-ea"/>
+                <a:cs typeface="+mn-cs"/>
+              </a:rPr>
+              <a:t>be</a:t>
+            </a:r>
+            <a:r>
+              <a:rPr kumimoji="0" lang="fr-FR" sz="1600" b="0" i="0" u="none" strike="noStrike" kern="1200" cap="none" spc="0" normalizeH="0" baseline="0" noProof="0" dirty="0">
+                <a:ln>
+                  <a:noFill/>
+                </a:ln>
+                <a:solidFill>
+                  <a:prstClr val="black"/>
+                </a:solidFill>
+                <a:effectLst/>
+                <a:uLnTx/>
+                <a:uFillTx/>
+                <a:latin typeface="Calibri" panose="020F0502020204030204"/>
+                <a:ea typeface="+mn-ea"/>
+                <a:cs typeface="+mn-cs"/>
+              </a:rPr>
+              <a:t> </a:t>
+            </a:r>
+            <a:r>
+              <a:rPr kumimoji="0" lang="fr-FR" sz="1600" b="0" i="0" u="none" strike="noStrike" kern="1200" cap="none" spc="0" normalizeH="0" baseline="0" noProof="0" dirty="0" err="1">
+                <a:ln>
+                  <a:noFill/>
+                </a:ln>
+                <a:solidFill>
+                  <a:prstClr val="black"/>
+                </a:solidFill>
+                <a:effectLst/>
+                <a:uLnTx/>
+                <a:uFillTx/>
+                <a:latin typeface="Calibri" panose="020F0502020204030204"/>
+                <a:ea typeface="+mn-ea"/>
+                <a:cs typeface="+mn-cs"/>
+              </a:rPr>
+              <a:t>loged</a:t>
+            </a:r>
+            <a:r>
+              <a:rPr kumimoji="0" lang="fr-FR" sz="1600" b="0" i="0" u="none" strike="noStrike" kern="1200" cap="none" spc="0" normalizeH="0" baseline="0" noProof="0" dirty="0">
+                <a:ln>
+                  <a:noFill/>
+                </a:ln>
+                <a:solidFill>
+                  <a:prstClr val="black"/>
+                </a:solidFill>
+                <a:effectLst/>
+                <a:uLnTx/>
+                <a:uFillTx/>
+                <a:latin typeface="Calibri" panose="020F0502020204030204"/>
+                <a:ea typeface="+mn-ea"/>
+                <a:cs typeface="+mn-cs"/>
+              </a:rPr>
+              <a:t> </a:t>
+            </a:r>
+            <a:r>
+              <a:rPr kumimoji="0" lang="fr-FR" sz="1600" b="0" i="0" u="none" strike="noStrike" kern="1200" cap="none" spc="0" normalizeH="0" baseline="0" noProof="0" dirty="0" err="1">
+                <a:ln>
+                  <a:noFill/>
+                </a:ln>
+                <a:solidFill>
+                  <a:prstClr val="black"/>
+                </a:solidFill>
+                <a:effectLst/>
+                <a:uLnTx/>
+                <a:uFillTx/>
+                <a:latin typeface="Calibri" panose="020F0502020204030204"/>
+                <a:ea typeface="+mn-ea"/>
+                <a:cs typeface="+mn-cs"/>
+              </a:rPr>
+              <a:t>each</a:t>
+            </a:r>
+            <a:r>
+              <a:rPr kumimoji="0" lang="fr-FR" sz="1600" b="0" i="0" u="none" strike="noStrike" kern="1200" cap="none" spc="0" normalizeH="0" baseline="0" noProof="0" dirty="0">
+                <a:ln>
+                  <a:noFill/>
+                </a:ln>
+                <a:solidFill>
+                  <a:prstClr val="black"/>
+                </a:solidFill>
+                <a:effectLst/>
+                <a:uLnTx/>
+                <a:uFillTx/>
+                <a:latin typeface="Calibri" panose="020F0502020204030204"/>
+                <a:ea typeface="+mn-ea"/>
+                <a:cs typeface="+mn-cs"/>
+              </a:rPr>
+              <a:t> time the application </a:t>
+            </a:r>
+            <a:r>
+              <a:rPr kumimoji="0" lang="fr-FR" sz="1600" b="0" i="0" u="none" strike="noStrike" kern="1200" cap="none" spc="0" normalizeH="0" baseline="0" noProof="0" dirty="0" err="1">
+                <a:ln>
+                  <a:noFill/>
+                </a:ln>
+                <a:solidFill>
+                  <a:prstClr val="black"/>
+                </a:solidFill>
+                <a:effectLst/>
+                <a:uLnTx/>
+                <a:uFillTx/>
+                <a:latin typeface="Calibri" panose="020F0502020204030204"/>
+                <a:ea typeface="+mn-ea"/>
+                <a:cs typeface="+mn-cs"/>
+              </a:rPr>
+              <a:t>is</a:t>
+            </a:r>
+            <a:r>
+              <a:rPr kumimoji="0" lang="fr-FR" sz="1600" b="0" i="0" u="none" strike="noStrike" kern="1200" cap="none" spc="0" normalizeH="0" baseline="0" noProof="0" dirty="0">
+                <a:ln>
+                  <a:noFill/>
+                </a:ln>
+                <a:solidFill>
+                  <a:prstClr val="black"/>
+                </a:solidFill>
+                <a:effectLst/>
+                <a:uLnTx/>
+                <a:uFillTx/>
+                <a:latin typeface="Calibri" panose="020F0502020204030204"/>
+                <a:ea typeface="+mn-ea"/>
+                <a:cs typeface="+mn-cs"/>
+              </a:rPr>
+              <a:t> open</a:t>
+            </a:r>
+            <a:br>
+              <a:rPr lang="fr-FR" sz="1600" dirty="0"/>
+            </a:br>
+            <a:r>
+              <a:rPr kumimoji="0" lang="fr-FR" sz="1600" b="0" i="0" u="none" strike="noStrike" kern="1200" cap="none" spc="0" normalizeH="0" baseline="0" noProof="0" dirty="0">
+                <a:ln>
+                  <a:noFill/>
+                </a:ln>
+                <a:solidFill>
+                  <a:prstClr val="black"/>
+                </a:solidFill>
+                <a:effectLst/>
+                <a:uLnTx/>
+                <a:uFillTx/>
+                <a:latin typeface="Calibri" panose="020F0502020204030204"/>
+                <a:ea typeface="+mn-ea"/>
+                <a:cs typeface="+mn-cs"/>
+              </a:rPr>
+              <a:t>… </a:t>
+            </a:r>
+            <a:r>
+              <a:rPr kumimoji="0" lang="fr-FR" sz="1600" b="0" i="0" u="none" strike="noStrike" kern="1200" cap="none" spc="0" normalizeH="0" baseline="0" noProof="0" dirty="0" err="1">
+                <a:ln>
+                  <a:noFill/>
+                </a:ln>
+                <a:solidFill>
+                  <a:srgbClr val="FFC000"/>
+                </a:solidFill>
+                <a:effectLst/>
+                <a:uLnTx/>
+                <a:uFillTx/>
+                <a:latin typeface="Calibri" panose="020F0502020204030204"/>
+                <a:ea typeface="+mn-ea"/>
+                <a:cs typeface="+mn-cs"/>
+              </a:rPr>
+              <a:t>then</a:t>
+            </a:r>
+            <a:r>
+              <a:rPr kumimoji="0" lang="fr-FR" sz="1600" b="0" i="0" u="none" strike="noStrike" kern="1200" cap="none" spc="0" normalizeH="0" baseline="0" noProof="0" dirty="0">
+                <a:ln>
+                  <a:noFill/>
+                </a:ln>
+                <a:solidFill>
+                  <a:srgbClr val="FFC000"/>
+                </a:solidFill>
+                <a:effectLst/>
+                <a:uLnTx/>
+                <a:uFillTx/>
+                <a:latin typeface="Calibri" panose="020F0502020204030204"/>
+                <a:ea typeface="+mn-ea"/>
+                <a:cs typeface="+mn-cs"/>
+              </a:rPr>
+              <a:t> </a:t>
+            </a:r>
+            <a:r>
+              <a:rPr kumimoji="0" lang="fr-FR" sz="1600" b="0" i="0" u="none" strike="noStrike" kern="1200" cap="none" spc="0" normalizeH="0" baseline="0" noProof="0" dirty="0" err="1">
+                <a:ln>
+                  <a:noFill/>
+                </a:ln>
+                <a:solidFill>
+                  <a:srgbClr val="FFC000"/>
+                </a:solidFill>
+                <a:effectLst/>
+                <a:uLnTx/>
+                <a:uFillTx/>
+                <a:latin typeface="Calibri" panose="020F0502020204030204"/>
+                <a:ea typeface="+mn-ea"/>
+                <a:cs typeface="+mn-cs"/>
+              </a:rPr>
+              <a:t>only</a:t>
+            </a:r>
+            <a:r>
+              <a:rPr kumimoji="0" lang="fr-FR" sz="1600" b="0" i="0" u="none" strike="noStrike" kern="1200" cap="none" spc="0" normalizeH="0" baseline="0" noProof="0" dirty="0">
+                <a:ln>
+                  <a:noFill/>
+                </a:ln>
+                <a:solidFill>
+                  <a:srgbClr val="FFC000"/>
+                </a:solidFill>
+                <a:effectLst/>
+                <a:uLnTx/>
+                <a:uFillTx/>
+                <a:latin typeface="Calibri" panose="020F0502020204030204"/>
+                <a:ea typeface="+mn-ea"/>
+                <a:cs typeface="+mn-cs"/>
+              </a:rPr>
+              <a:t> </a:t>
+            </a:r>
+            <a:r>
+              <a:rPr kumimoji="0" lang="fr-FR" sz="1600" b="0" i="0" u="none" strike="noStrike" kern="1200" cap="none" spc="0" normalizeH="0" baseline="0" noProof="0" dirty="0" err="1">
+                <a:ln>
+                  <a:noFill/>
+                </a:ln>
+                <a:solidFill>
+                  <a:srgbClr val="FFC000"/>
+                </a:solidFill>
+                <a:effectLst/>
+                <a:uLnTx/>
+                <a:uFillTx/>
+                <a:latin typeface="Calibri" panose="020F0502020204030204"/>
+                <a:ea typeface="+mn-ea"/>
+                <a:cs typeface="+mn-cs"/>
+              </a:rPr>
+              <a:t>autorized</a:t>
+            </a:r>
+            <a:r>
+              <a:rPr kumimoji="0" lang="fr-FR" sz="1600" b="0" i="0" u="none" strike="noStrike" kern="1200" cap="none" spc="0" normalizeH="0" baseline="0" noProof="0" dirty="0">
+                <a:ln>
+                  <a:noFill/>
+                </a:ln>
+                <a:solidFill>
+                  <a:srgbClr val="FFC000"/>
+                </a:solidFill>
+                <a:effectLst/>
+                <a:uLnTx/>
+                <a:uFillTx/>
+                <a:latin typeface="Calibri" panose="020F0502020204030204"/>
+                <a:ea typeface="+mn-ea"/>
+                <a:cs typeface="+mn-cs"/>
+              </a:rPr>
+              <a:t> people can </a:t>
+            </a:r>
+            <a:r>
+              <a:rPr kumimoji="0" lang="fr-FR" sz="1600" b="0" i="0" u="none" strike="noStrike" kern="1200" cap="none" spc="0" normalizeH="0" baseline="0" noProof="0" dirty="0" err="1">
+                <a:ln>
+                  <a:noFill/>
+                </a:ln>
+                <a:solidFill>
+                  <a:srgbClr val="FFC000"/>
+                </a:solidFill>
+                <a:effectLst/>
+                <a:uLnTx/>
+                <a:uFillTx/>
+                <a:latin typeface="Calibri" panose="020F0502020204030204"/>
+                <a:ea typeface="+mn-ea"/>
+                <a:cs typeface="+mn-cs"/>
+              </a:rPr>
+              <a:t>view</a:t>
+            </a:r>
+            <a:r>
+              <a:rPr kumimoji="0" lang="fr-FR" sz="1600" b="0" i="0" u="none" strike="noStrike" kern="1200" cap="none" spc="0" normalizeH="0" baseline="0" noProof="0" dirty="0">
+                <a:ln>
+                  <a:noFill/>
+                </a:ln>
+                <a:solidFill>
+                  <a:srgbClr val="FFC000"/>
+                </a:solidFill>
+                <a:effectLst/>
+                <a:uLnTx/>
+                <a:uFillTx/>
+                <a:latin typeface="Calibri" panose="020F0502020204030204"/>
+                <a:ea typeface="+mn-ea"/>
+                <a:cs typeface="+mn-cs"/>
+              </a:rPr>
+              <a:t> data</a:t>
+            </a:r>
+            <a:r>
+              <a:rPr kumimoji="0" lang="fr-FR" sz="1600" b="0" i="0" u="none" strike="noStrike" kern="1200" cap="none" spc="0" normalizeH="0" baseline="0" noProof="0" dirty="0">
+                <a:ln>
+                  <a:noFill/>
+                </a:ln>
+                <a:solidFill>
+                  <a:prstClr val="black"/>
+                </a:solidFill>
+                <a:effectLst/>
+                <a:uLnTx/>
+                <a:uFillTx/>
+                <a:latin typeface="Calibri" panose="020F0502020204030204"/>
+                <a:ea typeface="+mn-ea"/>
+                <a:cs typeface="+mn-cs"/>
+              </a:rPr>
+              <a:t> »</a:t>
+            </a:r>
+          </a:p>
+        </p:txBody>
+      </p:sp>
+      <p:sp>
+        <p:nvSpPr>
+          <p:cNvPr id="12" name="ZoneTexte 11">
+            <a:extLst>
+              <a:ext uri="{FF2B5EF4-FFF2-40B4-BE49-F238E27FC236}">
+                <a16:creationId xmlns:a16="http://schemas.microsoft.com/office/drawing/2014/main" id="{1BB2BDD0-2CA6-D5FA-FC97-6B6DE61A458F}"/>
+              </a:ext>
+            </a:extLst>
+          </p:cNvPr>
+          <p:cNvSpPr txBox="1"/>
+          <p:nvPr/>
+        </p:nvSpPr>
+        <p:spPr>
+          <a:xfrm>
+            <a:off x="6217920" y="1517603"/>
+            <a:ext cx="5795750" cy="830997"/>
+          </a:xfrm>
+          <a:prstGeom prst="rect">
+            <a:avLst/>
+          </a:prstGeom>
+          <a:noFill/>
+        </p:spPr>
+        <p:txBody>
+          <a:bodyPr wrap="square">
+            <a:spAutoFit/>
+          </a:bodyPr>
+          <a:lstStyle/>
+          <a:p>
+            <a:pPr algn="r"/>
+            <a:br>
+              <a:rPr kumimoji="0" lang="fr-FR" sz="1600" b="0" i="0" u="none" strike="noStrike" kern="1200" cap="none" spc="0" normalizeH="0" baseline="0" noProof="0" dirty="0">
+                <a:ln>
+                  <a:noFill/>
+                </a:ln>
+                <a:solidFill>
+                  <a:prstClr val="black"/>
+                </a:solidFill>
+                <a:effectLst/>
+                <a:uLnTx/>
+                <a:uFillTx/>
+                <a:latin typeface="Calibri" panose="020F0502020204030204"/>
+                <a:ea typeface="+mn-ea"/>
+                <a:cs typeface="+mn-cs"/>
+              </a:rPr>
+            </a:br>
+            <a:r>
+              <a:rPr lang="fr-FR" sz="1600" dirty="0"/>
+              <a:t>« </a:t>
+            </a:r>
+            <a:r>
+              <a:rPr lang="fr-FR" sz="1600" dirty="0">
+                <a:solidFill>
+                  <a:srgbClr val="00B0F0"/>
+                </a:solidFill>
+              </a:rPr>
+              <a:t>As a Global </a:t>
+            </a:r>
+            <a:r>
+              <a:rPr lang="fr-FR" sz="1600" dirty="0" err="1">
+                <a:solidFill>
+                  <a:srgbClr val="00B0F0"/>
+                </a:solidFill>
+              </a:rPr>
+              <a:t>Quality</a:t>
+            </a:r>
+            <a:r>
+              <a:rPr lang="fr-FR" sz="1600" dirty="0">
+                <a:solidFill>
+                  <a:srgbClr val="00B0F0"/>
+                </a:solidFill>
+              </a:rPr>
+              <a:t> Manager, </a:t>
+            </a:r>
+            <a:r>
+              <a:rPr lang="fr-FR" sz="1600" dirty="0"/>
+              <a:t>I </a:t>
+            </a:r>
+            <a:r>
+              <a:rPr lang="fr-FR" sz="1600" dirty="0" err="1"/>
+              <a:t>need</a:t>
+            </a:r>
+            <a:r>
+              <a:rPr lang="fr-FR" sz="1600" dirty="0"/>
+              <a:t> </a:t>
+            </a:r>
+            <a:r>
+              <a:rPr lang="fr-FR" sz="1600" dirty="0" err="1"/>
+              <a:t>users</a:t>
+            </a:r>
+            <a:r>
+              <a:rPr lang="fr-FR" sz="1600" dirty="0"/>
+              <a:t> to have </a:t>
+            </a:r>
+            <a:r>
+              <a:rPr lang="fr-FR" sz="1600" dirty="0" err="1"/>
+              <a:t>dedicated</a:t>
+            </a:r>
+            <a:r>
+              <a:rPr lang="fr-FR" sz="1600" dirty="0"/>
+              <a:t> </a:t>
+            </a:r>
+            <a:r>
+              <a:rPr lang="fr-FR" sz="1600" dirty="0" err="1"/>
+              <a:t>roles</a:t>
+            </a:r>
+            <a:br>
+              <a:rPr lang="fr-FR" sz="1600" dirty="0"/>
+            </a:br>
+            <a:r>
+              <a:rPr lang="fr-FR" sz="1600" dirty="0"/>
+              <a:t>… </a:t>
+            </a:r>
+            <a:r>
+              <a:rPr lang="fr-FR" sz="1600" dirty="0" err="1">
+                <a:solidFill>
+                  <a:srgbClr val="FFC000"/>
+                </a:solidFill>
+              </a:rPr>
+              <a:t>then</a:t>
+            </a:r>
+            <a:r>
+              <a:rPr lang="fr-FR" sz="1600" dirty="0">
+                <a:solidFill>
+                  <a:srgbClr val="FFC000"/>
+                </a:solidFill>
+              </a:rPr>
+              <a:t> I can </a:t>
+            </a:r>
+            <a:r>
+              <a:rPr lang="fr-FR" sz="1600" dirty="0" err="1">
+                <a:solidFill>
+                  <a:srgbClr val="FFC000"/>
+                </a:solidFill>
+              </a:rPr>
+              <a:t>ensure</a:t>
+            </a:r>
+            <a:r>
+              <a:rPr lang="fr-FR" sz="1600" dirty="0">
+                <a:solidFill>
+                  <a:srgbClr val="FFC000"/>
+                </a:solidFill>
+              </a:rPr>
+              <a:t> the compliance of </a:t>
+            </a:r>
+            <a:r>
+              <a:rPr lang="fr-FR" sz="1600" dirty="0" err="1">
+                <a:solidFill>
+                  <a:srgbClr val="FFC000"/>
+                </a:solidFill>
+              </a:rPr>
+              <a:t>my</a:t>
+            </a:r>
+            <a:r>
+              <a:rPr lang="fr-FR" sz="1600" dirty="0">
+                <a:solidFill>
+                  <a:srgbClr val="FFC000"/>
+                </a:solidFill>
+              </a:rPr>
+              <a:t> </a:t>
+            </a:r>
+            <a:r>
+              <a:rPr lang="fr-FR" sz="1600" dirty="0" err="1">
+                <a:solidFill>
+                  <a:srgbClr val="FFC000"/>
+                </a:solidFill>
+              </a:rPr>
+              <a:t>company</a:t>
+            </a:r>
+            <a:r>
+              <a:rPr lang="fr-FR" sz="1600" dirty="0"/>
+              <a:t> »</a:t>
+            </a:r>
+          </a:p>
+        </p:txBody>
+      </p:sp>
+    </p:spTree>
+    <p:extLst>
+      <p:ext uri="{BB962C8B-B14F-4D97-AF65-F5344CB8AC3E}">
+        <p14:creationId xmlns:p14="http://schemas.microsoft.com/office/powerpoint/2010/main" val="2657894650"/>
+      </p:ext>
+    </p:extLst>
+  </p:cSld>
+  <p:clrMapOvr>
+    <a:masterClrMapping/>
+  </p:clrMapOvr>
+</p:sld>
+</file>
+
+<file path=ppt/slides/slide6.xml><?xml version="1.0" encoding="utf-8"?>
+<p:sld xmlns:a="http://schemas.openxmlformats.org/drawingml/2006/main" xmlns:r="http://schemas.openxmlformats.org/officeDocument/2006/relationships" xmlns:p="http://schemas.openxmlformats.org/presentationml/2006/main">
+  <p:cSld>
+    <p:spTree>
+      <p:nvGrpSpPr>
+        <p:cNvPr id="1" name=""/>
+        <p:cNvGrpSpPr/>
+        <p:nvPr/>
+      </p:nvGrpSpPr>
+      <p:grpSpPr>
+        <a:xfrm>
+          <a:off x="0" y="0"/>
+          <a:ext cx="0" cy="0"/>
+          <a:chOff x="0" y="0"/>
+          <a:chExt cx="0" cy="0"/>
+        </a:xfrm>
+      </p:grpSpPr>
+      <p:sp>
+        <p:nvSpPr>
+          <p:cNvPr id="2" name="Titre 1">
+            <a:extLst>
+              <a:ext uri="{FF2B5EF4-FFF2-40B4-BE49-F238E27FC236}">
+                <a16:creationId xmlns:a16="http://schemas.microsoft.com/office/drawing/2014/main" id="{8D0BE7B8-BD59-A209-C860-906E75523200}"/>
+              </a:ext>
+            </a:extLst>
+          </p:cNvPr>
+          <p:cNvSpPr>
+            <a:spLocks noGrp="1"/>
+          </p:cNvSpPr>
+          <p:nvPr>
+            <p:ph type="title"/>
+          </p:nvPr>
+        </p:nvSpPr>
+        <p:spPr>
+          <a:xfrm>
+            <a:off x="838200" y="294789"/>
+            <a:ext cx="10515600" cy="1325563"/>
+          </a:xfrm>
+          <a:ln w="19050">
+            <a:solidFill>
+              <a:srgbClr val="00B0F0"/>
+            </a:solidFill>
+          </a:ln>
+        </p:spPr>
+        <p:txBody>
+          <a:bodyPr vert="horz" lIns="91440" tIns="45720" rIns="91440" bIns="45720" rtlCol="0" anchor="ctr">
+            <a:normAutofit/>
+          </a:bodyPr>
+          <a:lstStyle/>
+          <a:p>
+            <a:pPr marL="0" indent="0">
+              <a:buNone/>
+            </a:pPr>
+            <a:r>
+              <a:rPr lang="fr-FR" sz="3200" b="1" dirty="0" err="1"/>
+              <a:t>Clinical</a:t>
+            </a:r>
+            <a:r>
+              <a:rPr lang="fr-FR" sz="3200" b="1" dirty="0"/>
+              <a:t> Trial Management</a:t>
+            </a:r>
+            <a:br>
+              <a:rPr lang="fr-FR" sz="3200" b="1" dirty="0"/>
+            </a:br>
+            <a:r>
+              <a:rPr lang="fr-FR" sz="1800" dirty="0"/>
+              <a:t>« </a:t>
+            </a:r>
+            <a:r>
+              <a:rPr lang="fr-FR" sz="1800" dirty="0">
+                <a:solidFill>
+                  <a:srgbClr val="00B0F0"/>
+                </a:solidFill>
+              </a:rPr>
+              <a:t>As a </a:t>
+            </a:r>
+            <a:r>
+              <a:rPr lang="fr-FR" sz="1800" dirty="0" err="1">
+                <a:solidFill>
+                  <a:srgbClr val="00B0F0"/>
+                </a:solidFill>
+              </a:rPr>
+              <a:t>Clinical</a:t>
+            </a:r>
+            <a:r>
+              <a:rPr lang="fr-FR" sz="1800" dirty="0">
+                <a:solidFill>
+                  <a:srgbClr val="00B0F0"/>
+                </a:solidFill>
+              </a:rPr>
+              <a:t> Trial Manger,</a:t>
+            </a:r>
+            <a:r>
+              <a:rPr lang="fr-FR" sz="1800" dirty="0"/>
+              <a:t> I </a:t>
+            </a:r>
+            <a:r>
+              <a:rPr lang="fr-FR" sz="1800" dirty="0" err="1"/>
+              <a:t>need</a:t>
+            </a:r>
+            <a:r>
+              <a:rPr lang="fr-FR" sz="1800" dirty="0"/>
+              <a:t> to </a:t>
+            </a:r>
+            <a:r>
+              <a:rPr lang="fr-FR" sz="1800" dirty="0" err="1"/>
+              <a:t>view</a:t>
+            </a:r>
+            <a:r>
+              <a:rPr lang="fr-FR" sz="1800" dirty="0"/>
+              <a:t> all </a:t>
+            </a:r>
+            <a:r>
+              <a:rPr lang="fr-FR" sz="1800" dirty="0" err="1"/>
+              <a:t>studies</a:t>
+            </a:r>
+            <a:r>
+              <a:rPr lang="fr-FR" sz="1800" dirty="0"/>
+              <a:t> in portfolio …</a:t>
+            </a:r>
+            <a:br>
+              <a:rPr lang="fr-FR" sz="1800" dirty="0"/>
+            </a:br>
+            <a:r>
+              <a:rPr lang="fr-FR" sz="1800" dirty="0"/>
+              <a:t>… </a:t>
+            </a:r>
+            <a:r>
+              <a:rPr lang="fr-FR" sz="1800" dirty="0" err="1">
+                <a:solidFill>
+                  <a:srgbClr val="FFC000"/>
+                </a:solidFill>
+              </a:rPr>
+              <a:t>then</a:t>
+            </a:r>
+            <a:r>
+              <a:rPr lang="fr-FR" sz="1800" dirty="0">
+                <a:solidFill>
+                  <a:srgbClr val="FFC000"/>
+                </a:solidFill>
+              </a:rPr>
+              <a:t> I can </a:t>
+            </a:r>
+            <a:r>
+              <a:rPr lang="fr-FR" sz="1800" dirty="0" err="1">
+                <a:solidFill>
+                  <a:srgbClr val="FFC000"/>
+                </a:solidFill>
+              </a:rPr>
+              <a:t>organize</a:t>
+            </a:r>
+            <a:r>
+              <a:rPr lang="fr-FR" sz="1800" dirty="0">
+                <a:solidFill>
+                  <a:srgbClr val="FFC000"/>
+                </a:solidFill>
+              </a:rPr>
+              <a:t> the planning and </a:t>
+            </a:r>
+            <a:r>
+              <a:rPr lang="fr-FR" sz="1800" dirty="0" err="1">
+                <a:solidFill>
+                  <a:srgbClr val="FFC000"/>
+                </a:solidFill>
+              </a:rPr>
+              <a:t>resources</a:t>
+            </a:r>
+            <a:r>
+              <a:rPr lang="fr-FR" sz="1800" dirty="0">
+                <a:solidFill>
+                  <a:srgbClr val="FFC000"/>
+                </a:solidFill>
+              </a:rPr>
+              <a:t> </a:t>
+            </a:r>
+            <a:r>
+              <a:rPr lang="fr-FR" sz="1800" dirty="0"/>
+              <a:t>»</a:t>
+            </a:r>
+          </a:p>
+        </p:txBody>
+      </p:sp>
+      <p:pic>
+        <p:nvPicPr>
+          <p:cNvPr id="4" name="Image 3">
+            <a:extLst>
+              <a:ext uri="{FF2B5EF4-FFF2-40B4-BE49-F238E27FC236}">
+                <a16:creationId xmlns:a16="http://schemas.microsoft.com/office/drawing/2014/main" id="{33DB2155-674E-2A0A-D517-B2BA87B85916}"/>
+              </a:ext>
+            </a:extLst>
+          </p:cNvPr>
+          <p:cNvPicPr>
+            <a:picLocks noChangeAspect="1"/>
+          </p:cNvPicPr>
+          <p:nvPr/>
+        </p:nvPicPr>
+        <p:blipFill>
+          <a:blip r:embed="rId2">
+            <a:extLst>
+              <a:ext uri="{28A0092B-C50C-407E-A947-70E740481C1C}">
+                <a14:useLocalDpi xmlns:a14="http://schemas.microsoft.com/office/drawing/2010/main" val="0"/>
+              </a:ext>
+            </a:extLst>
+          </a:blip>
+          <a:stretch>
+            <a:fillRect/>
+          </a:stretch>
+        </p:blipFill>
+        <p:spPr>
+          <a:xfrm>
+            <a:off x="9973977" y="360569"/>
+            <a:ext cx="1202754" cy="1202754"/>
+          </a:xfrm>
+          <a:prstGeom prst="rect">
+            <a:avLst/>
+          </a:prstGeom>
+        </p:spPr>
+      </p:pic>
+      <p:pic>
+        <p:nvPicPr>
+          <p:cNvPr id="5" name="Image 4">
+            <a:extLst>
+              <a:ext uri="{FF2B5EF4-FFF2-40B4-BE49-F238E27FC236}">
+                <a16:creationId xmlns:a16="http://schemas.microsoft.com/office/drawing/2014/main" id="{71742407-B7F5-6443-81A9-77CB1C28A726}"/>
+              </a:ext>
+            </a:extLst>
+          </p:cNvPr>
+          <p:cNvPicPr>
+            <a:picLocks noChangeAspect="1"/>
+          </p:cNvPicPr>
+          <p:nvPr/>
+        </p:nvPicPr>
+        <p:blipFill>
+          <a:blip r:embed="rId3"/>
+          <a:stretch>
+            <a:fillRect/>
+          </a:stretch>
+        </p:blipFill>
+        <p:spPr>
+          <a:xfrm>
+            <a:off x="2015490" y="1792467"/>
+            <a:ext cx="7786223" cy="4018432"/>
+          </a:xfrm>
+          <a:prstGeom prst="rect">
+            <a:avLst/>
+          </a:prstGeom>
+          <a:ln>
+            <a:noFill/>
+          </a:ln>
+          <a:effectLst>
+            <a:outerShdw blurRad="292100" dist="139700" dir="2700000" algn="tl" rotWithShape="0">
+              <a:srgbClr val="333333">
+                <a:alpha val="65000"/>
+              </a:srgbClr>
+            </a:outerShdw>
+          </a:effectLst>
+        </p:spPr>
+      </p:pic>
+    </p:spTree>
+    <p:extLst>
+      <p:ext uri="{BB962C8B-B14F-4D97-AF65-F5344CB8AC3E}">
+        <p14:creationId xmlns:p14="http://schemas.microsoft.com/office/powerpoint/2010/main" val="3257722746"/>
+      </p:ext>
+    </p:extLst>
+  </p:cSld>
+  <p:clrMapOvr>
+    <a:masterClrMapping/>
+  </p:clrMapOvr>
+</p:sld>
+</file>
+
+<file path=ppt/slides/slide7.xml><?xml version="1.0" encoding="utf-8"?>
+<p:sld xmlns:a="http://schemas.openxmlformats.org/drawingml/2006/main" xmlns:r="http://schemas.openxmlformats.org/officeDocument/2006/relationships" xmlns:p="http://schemas.openxmlformats.org/presentationml/2006/main">
+  <p:cSld>
+    <p:spTree>
+      <p:nvGrpSpPr>
+        <p:cNvPr id="1" name=""/>
+        <p:cNvGrpSpPr/>
+        <p:nvPr/>
+      </p:nvGrpSpPr>
+      <p:grpSpPr>
+        <a:xfrm>
+          <a:off x="0" y="0"/>
+          <a:ext cx="0" cy="0"/>
+          <a:chOff x="0" y="0"/>
+          <a:chExt cx="0" cy="0"/>
+        </a:xfrm>
+      </p:grpSpPr>
+      <p:sp>
+        <p:nvSpPr>
+          <p:cNvPr id="2" name="Titre 1">
+            <a:extLst>
+              <a:ext uri="{FF2B5EF4-FFF2-40B4-BE49-F238E27FC236}">
+                <a16:creationId xmlns:a16="http://schemas.microsoft.com/office/drawing/2014/main" id="{8D0BE7B8-BD59-A209-C860-906E75523200}"/>
+              </a:ext>
+            </a:extLst>
+          </p:cNvPr>
+          <p:cNvSpPr>
+            <a:spLocks noGrp="1"/>
+          </p:cNvSpPr>
+          <p:nvPr>
+            <p:ph type="title"/>
+          </p:nvPr>
+        </p:nvSpPr>
+        <p:spPr>
+          <a:xfrm>
+            <a:off x="838200" y="294789"/>
+            <a:ext cx="10515600" cy="1325563"/>
+          </a:xfrm>
+          <a:ln w="19050">
+            <a:solidFill>
+              <a:srgbClr val="00B0F0"/>
+            </a:solidFill>
+          </a:ln>
+        </p:spPr>
+        <p:txBody>
+          <a:bodyPr vert="horz" lIns="91440" tIns="45720" rIns="91440" bIns="45720" rtlCol="0" anchor="ctr">
+            <a:normAutofit/>
+          </a:bodyPr>
+          <a:lstStyle/>
+          <a:p>
+            <a:pPr marL="0" indent="0">
+              <a:buNone/>
+            </a:pPr>
+            <a:r>
+              <a:rPr lang="fr-FR" sz="3200" b="1" dirty="0" err="1"/>
+              <a:t>Clinical</a:t>
+            </a:r>
+            <a:r>
+              <a:rPr lang="fr-FR" sz="3200" b="1" dirty="0"/>
+              <a:t> Trial Management</a:t>
+            </a:r>
+            <a:br>
+              <a:rPr lang="fr-FR" sz="3200" b="1" dirty="0"/>
+            </a:br>
+            <a:r>
+              <a:rPr lang="fr-FR" sz="1800" dirty="0"/>
+              <a:t>« </a:t>
+            </a:r>
+            <a:r>
+              <a:rPr lang="fr-FR" sz="1800" dirty="0">
+                <a:solidFill>
+                  <a:srgbClr val="00B0F0"/>
+                </a:solidFill>
+              </a:rPr>
+              <a:t>As a </a:t>
+            </a:r>
+            <a:r>
+              <a:rPr lang="fr-FR" sz="1800" dirty="0" err="1">
+                <a:solidFill>
+                  <a:srgbClr val="00B0F0"/>
+                </a:solidFill>
+              </a:rPr>
+              <a:t>Clinical</a:t>
+            </a:r>
+            <a:r>
+              <a:rPr lang="fr-FR" sz="1800" dirty="0">
+                <a:solidFill>
+                  <a:srgbClr val="00B0F0"/>
+                </a:solidFill>
+              </a:rPr>
+              <a:t> People Manager, </a:t>
+            </a:r>
+            <a:r>
+              <a:rPr lang="fr-FR" sz="1800" dirty="0"/>
+              <a:t>I </a:t>
+            </a:r>
+            <a:r>
+              <a:rPr lang="fr-FR" sz="1800" dirty="0" err="1"/>
+              <a:t>need</a:t>
+            </a:r>
+            <a:r>
+              <a:rPr lang="fr-FR" sz="1800" dirty="0"/>
+              <a:t> to manage patients and </a:t>
+            </a:r>
+            <a:r>
+              <a:rPr lang="fr-FR" sz="1800" dirty="0" err="1"/>
+              <a:t>physicians</a:t>
+            </a:r>
+            <a:br>
+              <a:rPr lang="fr-FR" sz="1800" dirty="0"/>
+            </a:br>
+            <a:r>
+              <a:rPr lang="fr-FR" sz="1800" dirty="0"/>
+              <a:t>… </a:t>
+            </a:r>
+            <a:r>
+              <a:rPr lang="fr-FR" sz="1800" dirty="0" err="1">
+                <a:solidFill>
+                  <a:srgbClr val="FFC000"/>
+                </a:solidFill>
+              </a:rPr>
+              <a:t>then</a:t>
+            </a:r>
+            <a:r>
+              <a:rPr lang="fr-FR" sz="1800" dirty="0">
+                <a:solidFill>
+                  <a:srgbClr val="FFC000"/>
+                </a:solidFill>
+              </a:rPr>
+              <a:t> I can </a:t>
+            </a:r>
+            <a:r>
+              <a:rPr lang="fr-FR" sz="1800" dirty="0" err="1">
+                <a:solidFill>
+                  <a:srgbClr val="FFC000"/>
+                </a:solidFill>
+              </a:rPr>
+              <a:t>ensure</a:t>
+            </a:r>
+            <a:r>
+              <a:rPr lang="fr-FR" sz="1800" dirty="0">
+                <a:solidFill>
+                  <a:srgbClr val="FFC000"/>
+                </a:solidFill>
+              </a:rPr>
+              <a:t> </a:t>
+            </a:r>
+            <a:r>
+              <a:rPr lang="fr-FR" sz="1800" dirty="0" err="1">
+                <a:solidFill>
+                  <a:srgbClr val="FFC000"/>
+                </a:solidFill>
+              </a:rPr>
+              <a:t>availability</a:t>
+            </a:r>
+            <a:r>
+              <a:rPr lang="fr-FR" sz="1800" dirty="0">
+                <a:solidFill>
+                  <a:srgbClr val="FFC000"/>
+                </a:solidFill>
+              </a:rPr>
+              <a:t> of </a:t>
+            </a:r>
+            <a:r>
+              <a:rPr lang="fr-FR" sz="1800" dirty="0" err="1">
+                <a:solidFill>
+                  <a:srgbClr val="FFC000"/>
+                </a:solidFill>
+              </a:rPr>
+              <a:t>human</a:t>
+            </a:r>
+            <a:r>
+              <a:rPr lang="fr-FR" sz="1800" dirty="0">
+                <a:solidFill>
+                  <a:srgbClr val="FFC000"/>
+                </a:solidFill>
+              </a:rPr>
+              <a:t> </a:t>
+            </a:r>
+            <a:r>
+              <a:rPr lang="fr-FR" sz="1800" dirty="0" err="1">
+                <a:solidFill>
+                  <a:srgbClr val="FFC000"/>
+                </a:solidFill>
+              </a:rPr>
+              <a:t>resources</a:t>
+            </a:r>
+            <a:r>
+              <a:rPr lang="fr-FR" sz="1800" dirty="0"/>
+              <a:t> »</a:t>
+            </a:r>
+            <a:endParaRPr lang="fr-FR" sz="1800" b="1" dirty="0"/>
+          </a:p>
+        </p:txBody>
+      </p:sp>
+      <p:pic>
+        <p:nvPicPr>
+          <p:cNvPr id="4" name="Image 3">
+            <a:extLst>
+              <a:ext uri="{FF2B5EF4-FFF2-40B4-BE49-F238E27FC236}">
+                <a16:creationId xmlns:a16="http://schemas.microsoft.com/office/drawing/2014/main" id="{33DB2155-674E-2A0A-D517-B2BA87B85916}"/>
+              </a:ext>
+            </a:extLst>
+          </p:cNvPr>
+          <p:cNvPicPr>
+            <a:picLocks noChangeAspect="1"/>
+          </p:cNvPicPr>
+          <p:nvPr/>
+        </p:nvPicPr>
+        <p:blipFill>
+          <a:blip r:embed="rId2">
+            <a:extLst>
+              <a:ext uri="{28A0092B-C50C-407E-A947-70E740481C1C}">
+                <a14:useLocalDpi xmlns:a14="http://schemas.microsoft.com/office/drawing/2010/main" val="0"/>
+              </a:ext>
+            </a:extLst>
+          </a:blip>
+          <a:stretch>
+            <a:fillRect/>
+          </a:stretch>
+        </p:blipFill>
+        <p:spPr>
+          <a:xfrm>
+            <a:off x="9973977" y="360569"/>
+            <a:ext cx="1202754" cy="1202754"/>
+          </a:xfrm>
+          <a:prstGeom prst="rect">
+            <a:avLst/>
+          </a:prstGeom>
+        </p:spPr>
+      </p:pic>
+      <p:pic>
+        <p:nvPicPr>
+          <p:cNvPr id="5" name="Image 4">
+            <a:extLst>
+              <a:ext uri="{FF2B5EF4-FFF2-40B4-BE49-F238E27FC236}">
+                <a16:creationId xmlns:a16="http://schemas.microsoft.com/office/drawing/2014/main" id="{DDF87815-1667-186E-24D9-A75448178900}"/>
+              </a:ext>
+            </a:extLst>
+          </p:cNvPr>
+          <p:cNvPicPr>
+            <a:picLocks noChangeAspect="1"/>
+          </p:cNvPicPr>
+          <p:nvPr/>
+        </p:nvPicPr>
+        <p:blipFill>
+          <a:blip r:embed="rId3"/>
+          <a:stretch>
+            <a:fillRect/>
+          </a:stretch>
+        </p:blipFill>
+        <p:spPr>
+          <a:xfrm>
+            <a:off x="2015490" y="1792467"/>
+            <a:ext cx="7786223" cy="4024762"/>
+          </a:xfrm>
+          <a:prstGeom prst="rect">
+            <a:avLst/>
+          </a:prstGeom>
+          <a:ln>
+            <a:noFill/>
+          </a:ln>
+          <a:effectLst>
+            <a:outerShdw blurRad="292100" dist="139700" dir="2700000" algn="tl" rotWithShape="0">
+              <a:srgbClr val="333333">
+                <a:alpha val="65000"/>
+              </a:srgbClr>
+            </a:outerShdw>
+          </a:effectLst>
+        </p:spPr>
+      </p:pic>
+    </p:spTree>
+    <p:extLst>
+      <p:ext uri="{BB962C8B-B14F-4D97-AF65-F5344CB8AC3E}">
+        <p14:creationId xmlns:p14="http://schemas.microsoft.com/office/powerpoint/2010/main" val="1878857053"/>
       </p:ext>
     </p:extLst>
   </p:cSld>

</xml_diff>